<commit_message>
Ajout cours SQL Server
</commit_message>
<xml_diff>
--- a/2018-2019/SQL/Cours 1/SQL Server.pptx
+++ b/2018-2019/SQL/Cours 1/SQL Server.pptx
@@ -5,27 +5,28 @@
     <p:sldMasterId id="2147483711" r:id="rId1"/>
   </p:sldMasterIdLst>
   <p:notesMasterIdLst>
-    <p:notesMasterId r:id="rId17"/>
+    <p:notesMasterId r:id="rId18"/>
   </p:notesMasterIdLst>
   <p:handoutMasterIdLst>
-    <p:handoutMasterId r:id="rId18"/>
+    <p:handoutMasterId r:id="rId19"/>
   </p:handoutMasterIdLst>
   <p:sldIdLst>
     <p:sldId id="256" r:id="rId2"/>
     <p:sldId id="269" r:id="rId3"/>
-    <p:sldId id="257" r:id="rId4"/>
-    <p:sldId id="258" r:id="rId5"/>
-    <p:sldId id="259" r:id="rId6"/>
-    <p:sldId id="260" r:id="rId7"/>
-    <p:sldId id="264" r:id="rId8"/>
-    <p:sldId id="270" r:id="rId9"/>
-    <p:sldId id="261" r:id="rId10"/>
-    <p:sldId id="262" r:id="rId11"/>
-    <p:sldId id="263" r:id="rId12"/>
-    <p:sldId id="265" r:id="rId13"/>
-    <p:sldId id="266" r:id="rId14"/>
-    <p:sldId id="267" r:id="rId15"/>
-    <p:sldId id="268" r:id="rId16"/>
+    <p:sldId id="271" r:id="rId4"/>
+    <p:sldId id="257" r:id="rId5"/>
+    <p:sldId id="258" r:id="rId6"/>
+    <p:sldId id="259" r:id="rId7"/>
+    <p:sldId id="260" r:id="rId8"/>
+    <p:sldId id="264" r:id="rId9"/>
+    <p:sldId id="270" r:id="rId10"/>
+    <p:sldId id="261" r:id="rId11"/>
+    <p:sldId id="262" r:id="rId12"/>
+    <p:sldId id="263" r:id="rId13"/>
+    <p:sldId id="265" r:id="rId14"/>
+    <p:sldId id="266" r:id="rId15"/>
+    <p:sldId id="267" r:id="rId16"/>
+    <p:sldId id="268" r:id="rId17"/>
   </p:sldIdLst>
   <p:sldSz cx="12192000" cy="6858000"/>
   <p:notesSz cx="6858000" cy="9945688"/>
@@ -240,7 +241,7 @@
           <a:p>
             <a:fld id="{AD8E0108-7974-4ECB-93ED-813DD6E524BF}" type="datetimeFigureOut">
               <a:rPr lang="fr-FR" smtClean="0"/>
-              <a:t>05/01/2019</a:t>
+              <a:t>06/01/2019</a:t>
             </a:fld>
             <a:endParaRPr lang="fr-FR"/>
           </a:p>
@@ -405,7 +406,7 @@
           <a:p>
             <a:fld id="{8A48E71D-2E5D-4F6E-A0DB-84CFC51B72F4}" type="datetimeFigureOut">
               <a:rPr lang="fr-FR" smtClean="0"/>
-              <a:t>05/01/2019</a:t>
+              <a:t>06/01/2019</a:t>
             </a:fld>
             <a:endParaRPr lang="fr-FR"/>
           </a:p>
@@ -851,7 +852,7 @@
           <a:effectLst/>
           <a:extLst>
             <a:ext uri="{91240B29-F687-4f45-9708-019B960494DF}">
-              <a14:hiddenLine xmlns:a14="http://schemas.microsoft.com/office/drawing/2010/main" xmlns="" w="9525">
+              <a14:hiddenLine xmlns="" xmlns:a14="http://schemas.microsoft.com/office/drawing/2010/main" w="9525">
                 <a:solidFill>
                   <a:srgbClr val="000000"/>
                 </a:solidFill>
@@ -1043,7 +1044,7 @@
           <a:p>
             <a:fld id="{B59687DF-E585-4C00-9CD3-38FCEA957542}" type="datetime1">
               <a:rPr lang="fr-FR" smtClean="0"/>
-              <a:t>05/01/2019</a:t>
+              <a:t>06/01/2019</a:t>
             </a:fld>
             <a:endParaRPr lang="fr-FR"/>
           </a:p>
@@ -1361,7 +1362,7 @@
           <a:p>
             <a:fld id="{D18F7F0D-2DAE-4AF0-BD70-ECD5138DCE5D}" type="datetime1">
               <a:rPr lang="fr-FR" smtClean="0"/>
-              <a:t>05/01/2019</a:t>
+              <a:t>06/01/2019</a:t>
             </a:fld>
             <a:endParaRPr lang="fr-FR"/>
           </a:p>
@@ -1849,7 +1850,7 @@
           <a:p>
             <a:fld id="{31E2BA6A-AB8B-401F-BF43-7CCA825E1B11}" type="datetime1">
               <a:rPr lang="fr-FR" smtClean="0"/>
-              <a:t>05/01/2019</a:t>
+              <a:t>06/01/2019</a:t>
             </a:fld>
             <a:endParaRPr lang="fr-FR"/>
           </a:p>
@@ -2218,7 +2219,7 @@
           <a:p>
             <a:fld id="{C79190D3-33D1-499A-88FD-0964A4F7BB86}" type="datetime1">
               <a:rPr lang="fr-FR" smtClean="0"/>
-              <a:t>05/01/2019</a:t>
+              <a:t>06/01/2019</a:t>
             </a:fld>
             <a:endParaRPr lang="fr-FR"/>
           </a:p>
@@ -2373,7 +2374,7 @@
           <a:ln/>
           <a:extLst>
             <a:ext uri="{91240B29-F687-4f45-9708-019B960494DF}">
-              <a14:hiddenLine xmlns:a14="http://schemas.microsoft.com/office/drawing/2010/main" xmlns="" w="9525">
+              <a14:hiddenLine xmlns="" xmlns:a14="http://schemas.microsoft.com/office/drawing/2010/main" w="9525">
                 <a:solidFill>
                   <a:srgbClr val="000000"/>
                 </a:solidFill>
@@ -2491,7 +2492,7 @@
           <a:p>
             <a:fld id="{06D6B756-8A55-427B-BB16-4F69F1DFDEC3}" type="datetime1">
               <a:rPr lang="fr-FR" smtClean="0"/>
-              <a:t>05/01/2019</a:t>
+              <a:t>06/01/2019</a:t>
             </a:fld>
             <a:endParaRPr lang="fr-FR"/>
           </a:p>
@@ -2648,7 +2649,7 @@
           <a:ln/>
           <a:extLst>
             <a:ext uri="{91240B29-F687-4f45-9708-019B960494DF}">
-              <a14:hiddenLine xmlns:a14="http://schemas.microsoft.com/office/drawing/2010/main" xmlns="" w="9525">
+              <a14:hiddenLine xmlns="" xmlns:a14="http://schemas.microsoft.com/office/drawing/2010/main" w="9525">
                 <a:solidFill>
                   <a:srgbClr val="000000"/>
                 </a:solidFill>
@@ -2776,7 +2777,7 @@
           <a:p>
             <a:fld id="{2924B7F3-EE86-4B89-A590-A25894AB6013}" type="datetime1">
               <a:rPr lang="fr-FR" smtClean="0"/>
-              <a:t>05/01/2019</a:t>
+              <a:t>06/01/2019</a:t>
             </a:fld>
             <a:endParaRPr lang="fr-FR"/>
           </a:p>
@@ -2931,7 +2932,7 @@
           <a:ln/>
           <a:extLst>
             <a:ext uri="{91240B29-F687-4f45-9708-019B960494DF}">
-              <a14:hiddenLine xmlns:a14="http://schemas.microsoft.com/office/drawing/2010/main" xmlns="" w="9525">
+              <a14:hiddenLine xmlns="" xmlns:a14="http://schemas.microsoft.com/office/drawing/2010/main" w="9525">
                 <a:solidFill>
                   <a:srgbClr val="000000"/>
                 </a:solidFill>
@@ -3365,7 +3366,7 @@
           <a:p>
             <a:fld id="{7C914A9B-8000-43D2-A631-9E8CCEE130EB}" type="datetime1">
               <a:rPr lang="fr-FR" smtClean="0"/>
-              <a:t>05/01/2019</a:t>
+              <a:t>06/01/2019</a:t>
             </a:fld>
             <a:endParaRPr lang="fr-FR"/>
           </a:p>
@@ -3520,7 +3521,7 @@
           <a:ln/>
           <a:extLst>
             <a:ext uri="{91240B29-F687-4f45-9708-019B960494DF}">
-              <a14:hiddenLine xmlns:a14="http://schemas.microsoft.com/office/drawing/2010/main" xmlns="" w="9525">
+              <a14:hiddenLine xmlns="" xmlns:a14="http://schemas.microsoft.com/office/drawing/2010/main" w="9525">
                 <a:solidFill>
                   <a:srgbClr val="000000"/>
                 </a:solidFill>
@@ -3704,7 +3705,7 @@
           <a:p>
             <a:fld id="{C06449E6-FA10-486F-9947-9B995442604E}" type="datetime1">
               <a:rPr lang="fr-FR" smtClean="0"/>
-              <a:t>05/01/2019</a:t>
+              <a:t>06/01/2019</a:t>
             </a:fld>
             <a:endParaRPr lang="fr-FR"/>
           </a:p>
@@ -3859,7 +3860,7 @@
           <a:ln/>
           <a:extLst>
             <a:ext uri="{91240B29-F687-4f45-9708-019B960494DF}">
-              <a14:hiddenLine xmlns:a14="http://schemas.microsoft.com/office/drawing/2010/main" xmlns="" w="9525">
+              <a14:hiddenLine xmlns="" xmlns:a14="http://schemas.microsoft.com/office/drawing/2010/main" w="9525">
                 <a:solidFill>
                   <a:srgbClr val="000000"/>
                 </a:solidFill>
@@ -4181,7 +4182,7 @@
           <a:p>
             <a:fld id="{CF845764-79E9-49B8-ABB2-BCA8901563F8}" type="datetime1">
               <a:rPr lang="fr-FR" smtClean="0"/>
-              <a:t>05/01/2019</a:t>
+              <a:t>06/01/2019</a:t>
             </a:fld>
             <a:endParaRPr lang="fr-FR"/>
           </a:p>
@@ -4336,7 +4337,7 @@
           <a:ln/>
           <a:extLst>
             <a:ext uri="{91240B29-F687-4f45-9708-019B960494DF}">
-              <a14:hiddenLine xmlns:a14="http://schemas.microsoft.com/office/drawing/2010/main" xmlns="" w="9525">
+              <a14:hiddenLine xmlns="" xmlns:a14="http://schemas.microsoft.com/office/drawing/2010/main" w="9525">
                 <a:solidFill>
                   <a:srgbClr val="000000"/>
                 </a:solidFill>
@@ -4402,7 +4403,7 @@
           <a:p>
             <a:fld id="{95008846-AA4C-4F54-AE82-4F7C2FA02BA7}" type="datetime1">
               <a:rPr lang="fr-FR" smtClean="0"/>
-              <a:t>05/01/2019</a:t>
+              <a:t>06/01/2019</a:t>
             </a:fld>
             <a:endParaRPr lang="fr-FR"/>
           </a:p>
@@ -4497,7 +4498,7 @@
           <a:p>
             <a:fld id="{69B2E184-DBD7-4549-9DE8-745F82C35770}" type="datetime1">
               <a:rPr lang="fr-FR" smtClean="0"/>
-              <a:t>05/01/2019</a:t>
+              <a:t>06/01/2019</a:t>
             </a:fld>
             <a:endParaRPr lang="fr-FR"/>
           </a:p>
@@ -4765,7 +4766,7 @@
           <a:ln/>
           <a:extLst>
             <a:ext uri="{91240B29-F687-4f45-9708-019B960494DF}">
-              <a14:hiddenLine xmlns:a14="http://schemas.microsoft.com/office/drawing/2010/main" xmlns="" w="9525">
+              <a14:hiddenLine xmlns="" xmlns:a14="http://schemas.microsoft.com/office/drawing/2010/main" w="9525">
                 <a:solidFill>
                   <a:srgbClr val="000000"/>
                 </a:solidFill>
@@ -4964,7 +4965,7 @@
           <a:p>
             <a:fld id="{E120388D-7709-4338-8275-1486D5196712}" type="datetime1">
               <a:rPr lang="fr-FR" smtClean="0"/>
-              <a:t>05/01/2019</a:t>
+              <a:t>06/01/2019</a:t>
             </a:fld>
             <a:endParaRPr lang="fr-FR"/>
           </a:p>
@@ -5277,7 +5278,7 @@
           <a:p>
             <a:fld id="{3B6E3DE8-ECAF-43C1-991E-7A233A4CDCA2}" type="datetime1">
               <a:rPr lang="fr-FR" smtClean="0"/>
-              <a:t>05/01/2019</a:t>
+              <a:t>06/01/2019</a:t>
             </a:fld>
             <a:endParaRPr lang="fr-FR"/>
           </a:p>
@@ -5547,7 +5548,7 @@
           <a:p>
             <a:fld id="{AB7B15F7-8D1B-4734-86F4-E6D97566F7CC}" type="datetime1">
               <a:rPr lang="fr-FR" smtClean="0"/>
-              <a:t>05/01/2019</a:t>
+              <a:t>06/01/2019</a:t>
             </a:fld>
             <a:endParaRPr lang="fr-FR"/>
           </a:p>
@@ -6103,7 +6104,7 @@
           <p:cNvPr id="2" name="Titre 1">
             <a:extLst>
               <a:ext uri="{FF2B5EF4-FFF2-40B4-BE49-F238E27FC236}">
-                <a16:creationId xmlns:a16="http://schemas.microsoft.com/office/drawing/2014/main" id="{8F3D2A49-CAC4-46D6-9A48-269A0F202759}"/>
+                <a16:creationId xmlns:a16="http://schemas.microsoft.com/office/drawing/2014/main" id="{76904944-C646-4205-8C2E-CF853FC666EF}"/>
               </a:ext>
             </a:extLst>
           </p:cNvPr>
@@ -6121,8 +6122,13 @@
           <a:p>
             <a:r>
               <a:rPr lang="fr-FR" dirty="0"/>
-              <a:t>Infrastructure – Base de données</a:t>
-            </a:r>
+              <a:t>Infrastructure –</a:t>
+            </a:r>
+            <a:r>
+              <a:rPr lang="fr-FR" baseline="0" dirty="0"/>
+              <a:t> Instance SQL</a:t>
+            </a:r>
+            <a:endParaRPr lang="fr-FR" dirty="0"/>
           </a:p>
         </p:txBody>
       </p:sp>
@@ -6131,7 +6137,7 @@
           <p:cNvPr id="3" name="Espace réservé du contenu 2">
             <a:extLst>
               <a:ext uri="{FF2B5EF4-FFF2-40B4-BE49-F238E27FC236}">
-                <a16:creationId xmlns:a16="http://schemas.microsoft.com/office/drawing/2014/main" id="{065DCCC2-14B4-4E48-9D4E-F7611DC5C476}"/>
+                <a16:creationId xmlns:a16="http://schemas.microsoft.com/office/drawing/2014/main" id="{59390CC6-3579-4822-916F-290AAD57A3AF}"/>
               </a:ext>
             </a:extLst>
           </p:cNvPr>
@@ -6149,38 +6155,47 @@
           <a:p>
             <a:r>
               <a:rPr lang="fr-FR" dirty="0"/>
-              <a:t>Contient</a:t>
+              <a:t>Instance SQL</a:t>
+            </a:r>
+          </a:p>
+          <a:p>
+            <a:pPr lvl="1"/>
+            <a:r>
+              <a:rPr lang="fr-FR" dirty="0"/>
+              <a:t>Plusieurs</a:t>
             </a:r>
             <a:r>
               <a:rPr lang="fr-FR" baseline="0" dirty="0"/>
-              <a:t> un ensemble de tables, vues, de fonctions et de procédures</a:t>
-            </a:r>
-          </a:p>
-          <a:p>
-            <a:r>
-              <a:rPr lang="fr-FR" baseline="0" dirty="0"/>
-              <a:t>Plusieurs BDD peuvent communiquer entre elles au sein d’une même instance</a:t>
-            </a:r>
+              <a:t> instances par machines possibles</a:t>
+            </a:r>
+            <a:endParaRPr lang="fr-FR" dirty="0"/>
           </a:p>
           <a:p>
             <a:pPr lvl="1"/>
             <a:r>
               <a:rPr lang="fr-FR" dirty="0"/>
-              <a:t>Rarement utilisé</a:t>
+              <a:t>1 instance = 1 service Windows</a:t>
             </a:r>
           </a:p>
           <a:p>
             <a:pPr lvl="1"/>
             <a:r>
               <a:rPr lang="fr-FR" dirty="0"/>
-              <a:t>Sauf pour des besoins horizontaux</a:t>
-            </a:r>
-          </a:p>
-          <a:p>
-            <a:pPr lvl="0"/>
-            <a:r>
-              <a:rPr lang="fr-FR" dirty="0"/>
-              <a:t>Décomposées en schémas</a:t>
+              <a:t>Instance nommée</a:t>
+            </a:r>
+          </a:p>
+          <a:p>
+            <a:pPr lvl="1"/>
+            <a:r>
+              <a:rPr lang="fr-FR" dirty="0"/>
+              <a:t>Instance par défaut</a:t>
+            </a:r>
+          </a:p>
+          <a:p>
+            <a:pPr lvl="1"/>
+            <a:r>
+              <a:rPr lang="fr-FR" dirty="0"/>
+              <a:t>N bases par instances</a:t>
             </a:r>
           </a:p>
         </p:txBody>
@@ -6190,7 +6205,7 @@
           <p:cNvPr id="4" name="Espace réservé du numéro de diapositive 3">
             <a:extLst>
               <a:ext uri="{FF2B5EF4-FFF2-40B4-BE49-F238E27FC236}">
-                <a16:creationId xmlns:a16="http://schemas.microsoft.com/office/drawing/2014/main" id="{A37F7C10-77E1-4E39-87F2-7A49276B7AE1}"/>
+                <a16:creationId xmlns:a16="http://schemas.microsoft.com/office/drawing/2014/main" id="{016A9C84-A7FE-4AC4-A029-F2536E01954B}"/>
               </a:ext>
             </a:extLst>
           </p:cNvPr>
@@ -6217,7 +6232,7 @@
     </p:spTree>
     <p:extLst>
       <p:ext uri="{BB962C8B-B14F-4D97-AF65-F5344CB8AC3E}">
-        <p14:creationId xmlns:p14="http://schemas.microsoft.com/office/powerpoint/2010/main" val="1009079898"/>
+        <p14:creationId xmlns:p14="http://schemas.microsoft.com/office/powerpoint/2010/main" val="1037439774"/>
       </p:ext>
     </p:extLst>
   </p:cSld>
@@ -6249,7 +6264,7 @@
           <p:cNvPr id="2" name="Titre 1">
             <a:extLst>
               <a:ext uri="{FF2B5EF4-FFF2-40B4-BE49-F238E27FC236}">
-                <a16:creationId xmlns:a16="http://schemas.microsoft.com/office/drawing/2014/main" id="{FC07BB3C-DCB5-4673-8B7E-F23CEDE9E425}"/>
+                <a16:creationId xmlns:a16="http://schemas.microsoft.com/office/drawing/2014/main" id="{8F3D2A49-CAC4-46D6-9A48-269A0F202759}"/>
               </a:ext>
             </a:extLst>
           </p:cNvPr>
@@ -6267,7 +6282,7 @@
           <a:p>
             <a:r>
               <a:rPr lang="fr-FR" dirty="0"/>
-              <a:t>Infrastructure – Schémas</a:t>
+              <a:t>Infrastructure – Base de données</a:t>
             </a:r>
           </a:p>
         </p:txBody>
@@ -6277,7 +6292,7 @@
           <p:cNvPr id="3" name="Espace réservé du contenu 2">
             <a:extLst>
               <a:ext uri="{FF2B5EF4-FFF2-40B4-BE49-F238E27FC236}">
-                <a16:creationId xmlns:a16="http://schemas.microsoft.com/office/drawing/2014/main" id="{503CA1F4-A807-4AB9-ACBB-229BBFA08778}"/>
+                <a16:creationId xmlns:a16="http://schemas.microsoft.com/office/drawing/2014/main" id="{065DCCC2-14B4-4E48-9D4E-F7611DC5C476}"/>
               </a:ext>
             </a:extLst>
           </p:cNvPr>
@@ -6295,31 +6310,38 @@
           <a:p>
             <a:r>
               <a:rPr lang="fr-FR" dirty="0"/>
-              <a:t>Les objets</a:t>
+              <a:t>Contient</a:t>
             </a:r>
             <a:r>
               <a:rPr lang="fr-FR" baseline="0" dirty="0"/>
-              <a:t> SQL appartiennent à un schéma</a:t>
+              <a:t> un ensemble de tables, vues, de fonctions et de procédures</a:t>
             </a:r>
           </a:p>
           <a:p>
             <a:r>
               <a:rPr lang="fr-FR" baseline="0" dirty="0"/>
-              <a:t>Les schémas sont utilisés pour regrouper des ensembles de données cohérentes</a:t>
+              <a:t>Plusieurs BDD peuvent communiquer entre elles au sein d’une même instance</a:t>
             </a:r>
           </a:p>
           <a:p>
             <a:pPr lvl="1"/>
             <a:r>
               <a:rPr lang="fr-FR" dirty="0"/>
-              <a:t>Convention</a:t>
+              <a:t>Rarement utilisé</a:t>
+            </a:r>
+          </a:p>
+          <a:p>
+            <a:pPr lvl="1"/>
+            <a:r>
+              <a:rPr lang="fr-FR" dirty="0"/>
+              <a:t>Sauf pour des besoins horizontaux</a:t>
             </a:r>
           </a:p>
           <a:p>
             <a:pPr lvl="0"/>
             <a:r>
               <a:rPr lang="fr-FR" dirty="0"/>
-              <a:t>Utilisé pour la gestion des droits</a:t>
+              <a:t>Décomposées en schémas</a:t>
             </a:r>
           </a:p>
         </p:txBody>
@@ -6329,7 +6351,7 @@
           <p:cNvPr id="4" name="Espace réservé du numéro de diapositive 3">
             <a:extLst>
               <a:ext uri="{FF2B5EF4-FFF2-40B4-BE49-F238E27FC236}">
-                <a16:creationId xmlns:a16="http://schemas.microsoft.com/office/drawing/2014/main" id="{A4469641-0153-4346-BC94-451C2A6CF934}"/>
+                <a16:creationId xmlns:a16="http://schemas.microsoft.com/office/drawing/2014/main" id="{A37F7C10-77E1-4E39-87F2-7A49276B7AE1}"/>
               </a:ext>
             </a:extLst>
           </p:cNvPr>
@@ -6356,7 +6378,7 @@
     </p:spTree>
     <p:extLst>
       <p:ext uri="{BB962C8B-B14F-4D97-AF65-F5344CB8AC3E}">
-        <p14:creationId xmlns:p14="http://schemas.microsoft.com/office/powerpoint/2010/main" val="1574749266"/>
+        <p14:creationId xmlns:p14="http://schemas.microsoft.com/office/powerpoint/2010/main" val="1009079898"/>
       </p:ext>
     </p:extLst>
   </p:cSld>
@@ -6388,7 +6410,7 @@
           <p:cNvPr id="2" name="Titre 1">
             <a:extLst>
               <a:ext uri="{FF2B5EF4-FFF2-40B4-BE49-F238E27FC236}">
-                <a16:creationId xmlns:a16="http://schemas.microsoft.com/office/drawing/2014/main" id="{C52AF28B-7492-4BD6-8091-134502108B76}"/>
+                <a16:creationId xmlns:a16="http://schemas.microsoft.com/office/drawing/2014/main" id="{FC07BB3C-DCB5-4673-8B7E-F23CEDE9E425}"/>
               </a:ext>
             </a:extLst>
           </p:cNvPr>
@@ -6406,7 +6428,7 @@
           <a:p>
             <a:r>
               <a:rPr lang="fr-FR" dirty="0"/>
-              <a:t>Sécurité – Authentification</a:t>
+              <a:t>Infrastructure – Schémas</a:t>
             </a:r>
           </a:p>
         </p:txBody>
@@ -6416,7 +6438,7 @@
           <p:cNvPr id="3" name="Espace réservé du contenu 2">
             <a:extLst>
               <a:ext uri="{FF2B5EF4-FFF2-40B4-BE49-F238E27FC236}">
-                <a16:creationId xmlns:a16="http://schemas.microsoft.com/office/drawing/2014/main" id="{E33F91A9-F450-414D-B5AB-03458ED4F706}"/>
+                <a16:creationId xmlns:a16="http://schemas.microsoft.com/office/drawing/2014/main" id="{503CA1F4-A807-4AB9-ACBB-229BBFA08778}"/>
               </a:ext>
             </a:extLst>
           </p:cNvPr>
@@ -6434,78 +6456,31 @@
           <a:p>
             <a:r>
               <a:rPr lang="fr-FR" dirty="0"/>
-              <a:t>Deux</a:t>
+              <a:t>Les objets</a:t>
             </a:r>
             <a:r>
               <a:rPr lang="fr-FR" baseline="0" dirty="0"/>
-              <a:t> modes de connexion</a:t>
+              <a:t> SQL appartiennent à un schéma</a:t>
+            </a:r>
+          </a:p>
+          <a:p>
+            <a:r>
+              <a:rPr lang="fr-FR" baseline="0" dirty="0"/>
+              <a:t>Les schémas sont utilisés pour regrouper des ensembles de données cohérentes</a:t>
             </a:r>
           </a:p>
           <a:p>
             <a:pPr lvl="1"/>
             <a:r>
               <a:rPr lang="fr-FR" dirty="0"/>
-              <a:t>Authentification Windows (Kerberos)</a:t>
-            </a:r>
-          </a:p>
-          <a:p>
-            <a:pPr lvl="2"/>
-            <a:r>
-              <a:rPr lang="fr-FR" dirty="0"/>
-              <a:t>Toujours</a:t>
-            </a:r>
-            <a:r>
-              <a:rPr lang="fr-FR" baseline="0" dirty="0"/>
-              <a:t> activé sur Windows, toujours un administrateur</a:t>
-            </a:r>
-          </a:p>
-          <a:p>
-            <a:pPr lvl="2"/>
-            <a:r>
-              <a:rPr lang="fr-FR" baseline="0" dirty="0"/>
-              <a:t>Attention à l’utilisateur courant</a:t>
-            </a:r>
-          </a:p>
-          <a:p>
-            <a:pPr lvl="2"/>
-            <a:r>
-              <a:rPr lang="fr-FR" dirty="0"/>
-              <a:t>Active Directory</a:t>
-            </a:r>
-          </a:p>
-          <a:p>
-            <a:pPr lvl="1"/>
-            <a:r>
-              <a:rPr lang="fr-FR" dirty="0"/>
-              <a:t>Authentification SQL</a:t>
-            </a:r>
-          </a:p>
-          <a:p>
-            <a:pPr lvl="2"/>
-            <a:r>
-              <a:rPr lang="fr-FR" dirty="0"/>
-              <a:t>Compte de connexion : couple login/mot de passe</a:t>
-            </a:r>
-          </a:p>
-          <a:p>
-            <a:pPr lvl="2"/>
-            <a:r>
-              <a:rPr lang="fr-FR" dirty="0"/>
-              <a:t>Désactivé par défaut sur Windows, obligatoire sous Linux</a:t>
-            </a:r>
-          </a:p>
-          <a:p>
-            <a:pPr lvl="3"/>
-            <a:r>
-              <a:rPr lang="fr-FR" dirty="0"/>
-              <a:t>Activable à l’installation, ou plus tard par configuration</a:t>
-            </a:r>
-          </a:p>
-          <a:p>
-            <a:pPr lvl="3"/>
-            <a:r>
-              <a:rPr lang="fr-FR" dirty="0"/>
-              <a:t>Un compte spécial « sa »</a:t>
+              <a:t>Convention</a:t>
+            </a:r>
+          </a:p>
+          <a:p>
+            <a:pPr lvl="0"/>
+            <a:r>
+              <a:rPr lang="fr-FR" dirty="0"/>
+              <a:t>Utilisé pour la gestion des droits</a:t>
             </a:r>
           </a:p>
         </p:txBody>
@@ -6515,7 +6490,7 @@
           <p:cNvPr id="4" name="Espace réservé du numéro de diapositive 3">
             <a:extLst>
               <a:ext uri="{FF2B5EF4-FFF2-40B4-BE49-F238E27FC236}">
-                <a16:creationId xmlns:a16="http://schemas.microsoft.com/office/drawing/2014/main" id="{674594EF-8DFD-4362-A8AD-6712DA67822F}"/>
+                <a16:creationId xmlns:a16="http://schemas.microsoft.com/office/drawing/2014/main" id="{A4469641-0153-4346-BC94-451C2A6CF934}"/>
               </a:ext>
             </a:extLst>
           </p:cNvPr>
@@ -6542,7 +6517,7 @@
     </p:spTree>
     <p:extLst>
       <p:ext uri="{BB962C8B-B14F-4D97-AF65-F5344CB8AC3E}">
-        <p14:creationId xmlns:p14="http://schemas.microsoft.com/office/powerpoint/2010/main" val="647325477"/>
+        <p14:creationId xmlns:p14="http://schemas.microsoft.com/office/powerpoint/2010/main" val="1574749266"/>
       </p:ext>
     </p:extLst>
   </p:cSld>
@@ -6574,7 +6549,7 @@
           <p:cNvPr id="2" name="Titre 1">
             <a:extLst>
               <a:ext uri="{FF2B5EF4-FFF2-40B4-BE49-F238E27FC236}">
-                <a16:creationId xmlns:a16="http://schemas.microsoft.com/office/drawing/2014/main" id="{5F76C771-E04F-4069-80A7-E29A9B055EA2}"/>
+                <a16:creationId xmlns:a16="http://schemas.microsoft.com/office/drawing/2014/main" id="{C52AF28B-7492-4BD6-8091-134502108B76}"/>
               </a:ext>
             </a:extLst>
           </p:cNvPr>
@@ -6592,7 +6567,7 @@
           <a:p>
             <a:r>
               <a:rPr lang="fr-FR" dirty="0"/>
-              <a:t>Sécurité – (Compte de) connexion</a:t>
+              <a:t>Sécurité – Authentification</a:t>
             </a:r>
           </a:p>
         </p:txBody>
@@ -6602,7 +6577,7 @@
           <p:cNvPr id="3" name="Espace réservé du contenu 2">
             <a:extLst>
               <a:ext uri="{FF2B5EF4-FFF2-40B4-BE49-F238E27FC236}">
-                <a16:creationId xmlns:a16="http://schemas.microsoft.com/office/drawing/2014/main" id="{50F96CE9-DCCC-4459-9F4C-B6A9D7151261}"/>
+                <a16:creationId xmlns:a16="http://schemas.microsoft.com/office/drawing/2014/main" id="{E33F91A9-F450-414D-B5AB-03458ED4F706}"/>
               </a:ext>
             </a:extLst>
           </p:cNvPr>
@@ -6620,78 +6595,78 @@
           <a:p>
             <a:r>
               <a:rPr lang="fr-FR" dirty="0"/>
-              <a:t>Un nom</a:t>
-            </a:r>
-          </a:p>
-          <a:p>
-            <a:r>
-              <a:rPr lang="fr-FR" dirty="0"/>
-              <a:t>Mode (SQL,</a:t>
+              <a:t>Deux</a:t>
             </a:r>
             <a:r>
               <a:rPr lang="fr-FR" baseline="0" dirty="0"/>
-              <a:t> Windows)</a:t>
+              <a:t> modes de connexion</a:t>
             </a:r>
           </a:p>
           <a:p>
             <a:pPr lvl="1"/>
             <a:r>
               <a:rPr lang="fr-FR" dirty="0"/>
-              <a:t>Si Windows, peut-être</a:t>
+              <a:t>Authentification Windows (Kerberos)</a:t>
+            </a:r>
+          </a:p>
+          <a:p>
+            <a:pPr lvl="2"/>
+            <a:r>
+              <a:rPr lang="fr-FR" dirty="0"/>
+              <a:t>Toujours</a:t>
             </a:r>
             <a:r>
               <a:rPr lang="fr-FR" baseline="0" dirty="0"/>
-              <a:t> un groupe AD</a:t>
+              <a:t> activé sur Windows, toujours un administrateur</a:t>
+            </a:r>
+          </a:p>
+          <a:p>
+            <a:pPr lvl="2"/>
+            <a:r>
+              <a:rPr lang="fr-FR" baseline="0" dirty="0"/>
+              <a:t>Attention à l’utilisateur courant</a:t>
+            </a:r>
+          </a:p>
+          <a:p>
+            <a:pPr lvl="2"/>
+            <a:r>
+              <a:rPr lang="fr-FR" dirty="0"/>
+              <a:t>Active Directory</a:t>
             </a:r>
           </a:p>
           <a:p>
             <a:pPr lvl="1"/>
             <a:r>
-              <a:rPr lang="fr-FR" baseline="0" dirty="0"/>
-              <a:t>Si SQL, mot de passe</a:t>
-            </a:r>
-          </a:p>
-          <a:p>
-            <a:pPr lvl="0"/>
-            <a:r>
-              <a:rPr lang="fr-FR" dirty="0"/>
-              <a:t>Privilèges</a:t>
-            </a:r>
-            <a:r>
-              <a:rPr lang="fr-FR" baseline="0" dirty="0"/>
-              <a:t> serveur</a:t>
-            </a:r>
-          </a:p>
-          <a:p>
-            <a:pPr lvl="1"/>
-            <a:r>
-              <a:rPr lang="fr-FR" dirty="0"/>
-              <a:t>CONNECT,</a:t>
-            </a:r>
-            <a:r>
-              <a:rPr lang="fr-FR" baseline="0" dirty="0"/>
-              <a:t> CREATE DATABASE etc.</a:t>
-            </a:r>
-          </a:p>
-          <a:p>
-            <a:pPr lvl="0"/>
-            <a:r>
-              <a:rPr lang="fr-FR" dirty="0"/>
-              <a:t>Login (« Utilisateur » en français)</a:t>
-            </a:r>
-          </a:p>
-          <a:p>
-            <a:pPr lvl="1"/>
-            <a:r>
-              <a:rPr lang="fr-FR" dirty="0"/>
-              <a:t>Affectation d’un compte à une base de données</a:t>
+              <a:rPr lang="fr-FR" dirty="0"/>
+              <a:t>Authentification SQL</a:t>
             </a:r>
           </a:p>
           <a:p>
             <a:pPr lvl="2"/>
             <a:r>
               <a:rPr lang="fr-FR" dirty="0"/>
-              <a:t>Droits spécifiques</a:t>
+              <a:t>Compte de connexion : couple login/mot de passe</a:t>
+            </a:r>
+          </a:p>
+          <a:p>
+            <a:pPr lvl="2"/>
+            <a:r>
+              <a:rPr lang="fr-FR" dirty="0"/>
+              <a:t>Désactivé par défaut sur Windows, obligatoire sous Linux</a:t>
+            </a:r>
+          </a:p>
+          <a:p>
+            <a:pPr lvl="3"/>
+            <a:r>
+              <a:rPr lang="fr-FR" dirty="0"/>
+              <a:t>Activable à l’installation, ou plus tard par configuration</a:t>
+            </a:r>
+          </a:p>
+          <a:p>
+            <a:pPr lvl="3"/>
+            <a:r>
+              <a:rPr lang="fr-FR" dirty="0"/>
+              <a:t>Un compte spécial « sa »</a:t>
             </a:r>
           </a:p>
         </p:txBody>
@@ -6701,7 +6676,7 @@
           <p:cNvPr id="4" name="Espace réservé du numéro de diapositive 3">
             <a:extLst>
               <a:ext uri="{FF2B5EF4-FFF2-40B4-BE49-F238E27FC236}">
-                <a16:creationId xmlns:a16="http://schemas.microsoft.com/office/drawing/2014/main" id="{E6EF23F3-5C98-41E2-BD1E-4CE67CD0456B}"/>
+                <a16:creationId xmlns:a16="http://schemas.microsoft.com/office/drawing/2014/main" id="{674594EF-8DFD-4362-A8AD-6712DA67822F}"/>
               </a:ext>
             </a:extLst>
           </p:cNvPr>
@@ -6728,7 +6703,7 @@
     </p:spTree>
     <p:extLst>
       <p:ext uri="{BB962C8B-B14F-4D97-AF65-F5344CB8AC3E}">
-        <p14:creationId xmlns:p14="http://schemas.microsoft.com/office/powerpoint/2010/main" val="304023661"/>
+        <p14:creationId xmlns:p14="http://schemas.microsoft.com/office/powerpoint/2010/main" val="647325477"/>
       </p:ext>
     </p:extLst>
   </p:cSld>
@@ -6760,7 +6735,7 @@
           <p:cNvPr id="2" name="Titre 1">
             <a:extLst>
               <a:ext uri="{FF2B5EF4-FFF2-40B4-BE49-F238E27FC236}">
-                <a16:creationId xmlns:a16="http://schemas.microsoft.com/office/drawing/2014/main" id="{A5C5F28D-6691-408C-B4C0-914C9463924A}"/>
+                <a16:creationId xmlns:a16="http://schemas.microsoft.com/office/drawing/2014/main" id="{5F76C771-E04F-4069-80A7-E29A9B055EA2}"/>
               </a:ext>
             </a:extLst>
           </p:cNvPr>
@@ -6778,13 +6753,8 @@
           <a:p>
             <a:r>
               <a:rPr lang="fr-FR" dirty="0"/>
-              <a:t>Sécurité</a:t>
-            </a:r>
-            <a:r>
-              <a:rPr lang="fr-FR" baseline="0" dirty="0"/>
-              <a:t> – Rôles</a:t>
-            </a:r>
-            <a:endParaRPr lang="fr-FR" dirty="0"/>
+              <a:t>Sécurité – (Compte de) connexion</a:t>
+            </a:r>
           </a:p>
         </p:txBody>
       </p:sp>
@@ -6793,7 +6763,7 @@
           <p:cNvPr id="3" name="Espace réservé du contenu 2">
             <a:extLst>
               <a:ext uri="{FF2B5EF4-FFF2-40B4-BE49-F238E27FC236}">
-                <a16:creationId xmlns:a16="http://schemas.microsoft.com/office/drawing/2014/main" id="{68DEB52D-D866-4A3D-8865-17070058C074}"/>
+                <a16:creationId xmlns:a16="http://schemas.microsoft.com/office/drawing/2014/main" id="{50F96CE9-DCCC-4459-9F4C-B6A9D7151261}"/>
               </a:ext>
             </a:extLst>
           </p:cNvPr>
@@ -6811,19 +6781,42 @@
           <a:p>
             <a:r>
               <a:rPr lang="fr-FR" dirty="0"/>
-              <a:t>Nommé</a:t>
-            </a:r>
-          </a:p>
-          <a:p>
-            <a:r>
-              <a:rPr lang="fr-FR" dirty="0"/>
-              <a:t>Ensemble de droits spécifiques attribuables à un compte ou à un utilisateur</a:t>
-            </a:r>
-          </a:p>
-          <a:p>
-            <a:r>
-              <a:rPr lang="fr-FR" dirty="0"/>
-              <a:t>Niveau</a:t>
+              <a:t>Un nom</a:t>
+            </a:r>
+          </a:p>
+          <a:p>
+            <a:r>
+              <a:rPr lang="fr-FR" dirty="0"/>
+              <a:t>Mode (SQL,</a:t>
+            </a:r>
+            <a:r>
+              <a:rPr lang="fr-FR" baseline="0" dirty="0"/>
+              <a:t> Windows)</a:t>
+            </a:r>
+          </a:p>
+          <a:p>
+            <a:pPr lvl="1"/>
+            <a:r>
+              <a:rPr lang="fr-FR" dirty="0"/>
+              <a:t>Si Windows, peut-être</a:t>
+            </a:r>
+            <a:r>
+              <a:rPr lang="fr-FR" baseline="0" dirty="0"/>
+              <a:t> un groupe AD</a:t>
+            </a:r>
+          </a:p>
+          <a:p>
+            <a:pPr lvl="1"/>
+            <a:r>
+              <a:rPr lang="fr-FR" baseline="0" dirty="0"/>
+              <a:t>Si SQL, mot de passe</a:t>
+            </a:r>
+          </a:p>
+          <a:p>
+            <a:pPr lvl="0"/>
+            <a:r>
+              <a:rPr lang="fr-FR" dirty="0"/>
+              <a:t>Privilèges</a:t>
             </a:r>
             <a:r>
               <a:rPr lang="fr-FR" baseline="0" dirty="0"/>
@@ -6833,69 +6826,33 @@
           <a:p>
             <a:pPr lvl="1"/>
             <a:r>
-              <a:rPr lang="fr-FR" dirty="0" err="1"/>
-              <a:t>sysadmin</a:t>
-            </a:r>
-            <a:endParaRPr lang="fr-FR" dirty="0"/>
+              <a:rPr lang="fr-FR" dirty="0"/>
+              <a:t>CONNECT,</a:t>
+            </a:r>
+            <a:r>
+              <a:rPr lang="fr-FR" baseline="0" dirty="0"/>
+              <a:t> CREATE DATABASE etc.</a:t>
+            </a:r>
+          </a:p>
+          <a:p>
+            <a:pPr lvl="0"/>
+            <a:r>
+              <a:rPr lang="fr-FR" dirty="0"/>
+              <a:t>Login (« Utilisateur » en français)</a:t>
+            </a:r>
           </a:p>
           <a:p>
             <a:pPr lvl="1"/>
             <a:r>
-              <a:rPr lang="fr-FR" dirty="0" err="1"/>
-              <a:t>dbcreator</a:t>
-            </a:r>
-            <a:endParaRPr lang="fr-FR" dirty="0"/>
-          </a:p>
-          <a:p>
-            <a:pPr lvl="1"/>
-            <a:r>
-              <a:rPr lang="fr-FR" dirty="0"/>
-              <a:t>public</a:t>
-            </a:r>
-          </a:p>
-          <a:p>
-            <a:pPr lvl="1"/>
-            <a:r>
-              <a:rPr lang="fr-FR" dirty="0"/>
-              <a:t>…</a:t>
-            </a:r>
-          </a:p>
-          <a:p>
-            <a:pPr lvl="0"/>
-            <a:r>
-              <a:rPr lang="fr-FR" dirty="0"/>
-              <a:t>Niveau BDD</a:t>
-            </a:r>
-          </a:p>
-          <a:p>
-            <a:pPr lvl="1"/>
-            <a:r>
-              <a:rPr lang="fr-FR" dirty="0" err="1"/>
-              <a:t>db_owner</a:t>
-            </a:r>
-            <a:endParaRPr lang="fr-FR" dirty="0"/>
-          </a:p>
-          <a:p>
-            <a:pPr lvl="1"/>
-            <a:r>
-              <a:rPr lang="fr-FR" dirty="0" err="1"/>
-              <a:t>db_datareader</a:t>
-            </a:r>
-            <a:endParaRPr lang="fr-FR" dirty="0"/>
-          </a:p>
-          <a:p>
-            <a:pPr lvl="1"/>
-            <a:r>
-              <a:rPr lang="fr-FR" dirty="0" err="1"/>
-              <a:t>db_datawriter</a:t>
-            </a:r>
-            <a:endParaRPr lang="fr-FR" dirty="0"/>
-          </a:p>
-          <a:p>
-            <a:pPr lvl="1"/>
-            <a:r>
-              <a:rPr lang="fr-FR" dirty="0"/>
-              <a:t>…</a:t>
+              <a:rPr lang="fr-FR" dirty="0"/>
+              <a:t>Affectation d’un compte à une base de données</a:t>
+            </a:r>
+          </a:p>
+          <a:p>
+            <a:pPr lvl="2"/>
+            <a:r>
+              <a:rPr lang="fr-FR" dirty="0"/>
+              <a:t>Droits spécifiques</a:t>
             </a:r>
           </a:p>
         </p:txBody>
@@ -6905,7 +6862,7 @@
           <p:cNvPr id="4" name="Espace réservé du numéro de diapositive 3">
             <a:extLst>
               <a:ext uri="{FF2B5EF4-FFF2-40B4-BE49-F238E27FC236}">
-                <a16:creationId xmlns:a16="http://schemas.microsoft.com/office/drawing/2014/main" id="{F1AA5EBF-7C3A-4756-871B-2F6063579B59}"/>
+                <a16:creationId xmlns:a16="http://schemas.microsoft.com/office/drawing/2014/main" id="{E6EF23F3-5C98-41E2-BD1E-4CE67CD0456B}"/>
               </a:ext>
             </a:extLst>
           </p:cNvPr>
@@ -6932,7 +6889,7 @@
     </p:spTree>
     <p:extLst>
       <p:ext uri="{BB962C8B-B14F-4D97-AF65-F5344CB8AC3E}">
-        <p14:creationId xmlns:p14="http://schemas.microsoft.com/office/powerpoint/2010/main" val="2653832294"/>
+        <p14:creationId xmlns:p14="http://schemas.microsoft.com/office/powerpoint/2010/main" val="304023661"/>
       </p:ext>
     </p:extLst>
   </p:cSld>
@@ -6964,6 +6921,210 @@
           <p:cNvPr id="2" name="Titre 1">
             <a:extLst>
               <a:ext uri="{FF2B5EF4-FFF2-40B4-BE49-F238E27FC236}">
+                <a16:creationId xmlns:a16="http://schemas.microsoft.com/office/drawing/2014/main" id="{A5C5F28D-6691-408C-B4C0-914C9463924A}"/>
+              </a:ext>
+            </a:extLst>
+          </p:cNvPr>
+          <p:cNvSpPr>
+            <a:spLocks noGrp="1"/>
+          </p:cNvSpPr>
+          <p:nvPr>
+            <p:ph type="title"/>
+          </p:nvPr>
+        </p:nvSpPr>
+        <p:spPr/>
+        <p:txBody>
+          <a:bodyPr/>
+          <a:lstStyle/>
+          <a:p>
+            <a:r>
+              <a:rPr lang="fr-FR" dirty="0"/>
+              <a:t>Sécurité</a:t>
+            </a:r>
+            <a:r>
+              <a:rPr lang="fr-FR" baseline="0" dirty="0"/>
+              <a:t> – Rôles</a:t>
+            </a:r>
+            <a:endParaRPr lang="fr-FR" dirty="0"/>
+          </a:p>
+        </p:txBody>
+      </p:sp>
+      <p:sp>
+        <p:nvSpPr>
+          <p:cNvPr id="3" name="Espace réservé du contenu 2">
+            <a:extLst>
+              <a:ext uri="{FF2B5EF4-FFF2-40B4-BE49-F238E27FC236}">
+                <a16:creationId xmlns:a16="http://schemas.microsoft.com/office/drawing/2014/main" id="{68DEB52D-D866-4A3D-8865-17070058C074}"/>
+              </a:ext>
+            </a:extLst>
+          </p:cNvPr>
+          <p:cNvSpPr>
+            <a:spLocks noGrp="1"/>
+          </p:cNvSpPr>
+          <p:nvPr>
+            <p:ph idx="1"/>
+          </p:nvPr>
+        </p:nvSpPr>
+        <p:spPr/>
+        <p:txBody>
+          <a:bodyPr/>
+          <a:lstStyle/>
+          <a:p>
+            <a:r>
+              <a:rPr lang="fr-FR" dirty="0"/>
+              <a:t>Nommé</a:t>
+            </a:r>
+          </a:p>
+          <a:p>
+            <a:r>
+              <a:rPr lang="fr-FR" dirty="0"/>
+              <a:t>Ensemble de droits spécifiques attribuables à un compte ou à un utilisateur</a:t>
+            </a:r>
+          </a:p>
+          <a:p>
+            <a:r>
+              <a:rPr lang="fr-FR" dirty="0"/>
+              <a:t>Niveau</a:t>
+            </a:r>
+            <a:r>
+              <a:rPr lang="fr-FR" baseline="0" dirty="0"/>
+              <a:t> serveur</a:t>
+            </a:r>
+          </a:p>
+          <a:p>
+            <a:pPr lvl="1"/>
+            <a:r>
+              <a:rPr lang="fr-FR" dirty="0" err="1"/>
+              <a:t>sysadmin</a:t>
+            </a:r>
+            <a:endParaRPr lang="fr-FR" dirty="0"/>
+          </a:p>
+          <a:p>
+            <a:pPr lvl="1"/>
+            <a:r>
+              <a:rPr lang="fr-FR" dirty="0" err="1"/>
+              <a:t>dbcreator</a:t>
+            </a:r>
+            <a:endParaRPr lang="fr-FR" dirty="0"/>
+          </a:p>
+          <a:p>
+            <a:pPr lvl="1"/>
+            <a:r>
+              <a:rPr lang="fr-FR" dirty="0"/>
+              <a:t>public</a:t>
+            </a:r>
+          </a:p>
+          <a:p>
+            <a:pPr lvl="1"/>
+            <a:r>
+              <a:rPr lang="fr-FR" dirty="0"/>
+              <a:t>…</a:t>
+            </a:r>
+          </a:p>
+          <a:p>
+            <a:pPr lvl="0"/>
+            <a:r>
+              <a:rPr lang="fr-FR" dirty="0"/>
+              <a:t>Niveau BDD</a:t>
+            </a:r>
+          </a:p>
+          <a:p>
+            <a:pPr lvl="1"/>
+            <a:r>
+              <a:rPr lang="fr-FR" dirty="0" err="1"/>
+              <a:t>db_owner</a:t>
+            </a:r>
+            <a:endParaRPr lang="fr-FR" dirty="0"/>
+          </a:p>
+          <a:p>
+            <a:pPr lvl="1"/>
+            <a:r>
+              <a:rPr lang="fr-FR" dirty="0" err="1"/>
+              <a:t>db_datareader</a:t>
+            </a:r>
+            <a:endParaRPr lang="fr-FR" dirty="0"/>
+          </a:p>
+          <a:p>
+            <a:pPr lvl="1"/>
+            <a:r>
+              <a:rPr lang="fr-FR" dirty="0" err="1"/>
+              <a:t>db_datawriter</a:t>
+            </a:r>
+            <a:endParaRPr lang="fr-FR" dirty="0"/>
+          </a:p>
+          <a:p>
+            <a:pPr lvl="1"/>
+            <a:r>
+              <a:rPr lang="fr-FR" dirty="0"/>
+              <a:t>…</a:t>
+            </a:r>
+          </a:p>
+        </p:txBody>
+      </p:sp>
+      <p:sp>
+        <p:nvSpPr>
+          <p:cNvPr id="4" name="Espace réservé du numéro de diapositive 3">
+            <a:extLst>
+              <a:ext uri="{FF2B5EF4-FFF2-40B4-BE49-F238E27FC236}">
+                <a16:creationId xmlns:a16="http://schemas.microsoft.com/office/drawing/2014/main" id="{F1AA5EBF-7C3A-4756-871B-2F6063579B59}"/>
+              </a:ext>
+            </a:extLst>
+          </p:cNvPr>
+          <p:cNvSpPr>
+            <a:spLocks noGrp="1"/>
+          </p:cNvSpPr>
+          <p:nvPr>
+            <p:ph type="sldNum" sz="quarter" idx="12"/>
+          </p:nvPr>
+        </p:nvSpPr>
+        <p:spPr/>
+        <p:txBody>
+          <a:bodyPr/>
+          <a:lstStyle/>
+          <a:p>
+            <a:fld id="{C4488D40-6A2B-42CD-9565-99D41B29C2DA}" type="slidenum">
+              <a:rPr lang="fr-FR" smtClean="0"/>
+              <a:t>15</a:t>
+            </a:fld>
+            <a:endParaRPr lang="fr-FR"/>
+          </a:p>
+        </p:txBody>
+      </p:sp>
+    </p:spTree>
+    <p:extLst>
+      <p:ext uri="{BB962C8B-B14F-4D97-AF65-F5344CB8AC3E}">
+        <p14:creationId xmlns:p14="http://schemas.microsoft.com/office/powerpoint/2010/main" val="2653832294"/>
+      </p:ext>
+    </p:extLst>
+  </p:cSld>
+  <p:clrMapOvr>
+    <a:masterClrMapping/>
+  </p:clrMapOvr>
+</p:sld>
+</file>
+
+<file path=ppt/slides/slide16.xml><?xml version="1.0" encoding="utf-8"?>
+<p:sld xmlns:a="http://schemas.openxmlformats.org/drawingml/2006/main" xmlns:r="http://schemas.openxmlformats.org/officeDocument/2006/relationships" xmlns:p="http://schemas.openxmlformats.org/presentationml/2006/main">
+  <p:cSld>
+    <p:spTree>
+      <p:nvGrpSpPr>
+        <p:cNvPr id="1" name=""/>
+        <p:cNvGrpSpPr/>
+        <p:nvPr/>
+      </p:nvGrpSpPr>
+      <p:grpSpPr>
+        <a:xfrm>
+          <a:off x="0" y="0"/>
+          <a:ext cx="0" cy="0"/>
+          <a:chOff x="0" y="0"/>
+          <a:chExt cx="0" cy="0"/>
+        </a:xfrm>
+      </p:grpSpPr>
+      <p:sp>
+        <p:nvSpPr>
+          <p:cNvPr id="2" name="Titre 1">
+            <a:extLst>
+              <a:ext uri="{FF2B5EF4-FFF2-40B4-BE49-F238E27FC236}">
                 <a16:creationId xmlns:a16="http://schemas.microsoft.com/office/drawing/2014/main" id="{3DFA1532-8483-4A1E-9C89-FC9699C956E1}"/>
               </a:ext>
             </a:extLst>
@@ -7015,7 +7176,7 @@
           <a:bodyPr/>
           <a:lstStyle/>
           <a:p>
-            <a:endParaRPr lang="fr-FR"/>
+            <a:endParaRPr lang="fr-FR" dirty="0"/>
           </a:p>
         </p:txBody>
       </p:sp>
@@ -7042,7 +7203,7 @@
           <a:p>
             <a:fld id="{C4488D40-6A2B-42CD-9565-99D41B29C2DA}" type="slidenum">
               <a:rPr lang="fr-FR" smtClean="0"/>
-              <a:t>15</a:t>
+              <a:t>16</a:t>
             </a:fld>
             <a:endParaRPr lang="fr-FR"/>
           </a:p>
@@ -7275,7 +7436,7 @@
           <p:cNvPr id="2" name="Titre 1">
             <a:extLst>
               <a:ext uri="{FF2B5EF4-FFF2-40B4-BE49-F238E27FC236}">
-                <a16:creationId xmlns:a16="http://schemas.microsoft.com/office/drawing/2014/main" id="{217FEAFC-2EEE-4C5A-848E-A160E2807582}"/>
+                <a16:creationId xmlns:a16="http://schemas.microsoft.com/office/drawing/2014/main" id="{026163C3-C3EA-4779-8D9E-BDD4CD37C888}"/>
               </a:ext>
             </a:extLst>
           </p:cNvPr>
@@ -7293,7 +7454,7 @@
           <a:p>
             <a:r>
               <a:rPr lang="fr-FR" dirty="0"/>
-              <a:t>SQL Server</a:t>
+              <a:t>Plan du cours</a:t>
             </a:r>
           </a:p>
         </p:txBody>
@@ -7303,7 +7464,7 @@
           <p:cNvPr id="3" name="Espace réservé du contenu 2">
             <a:extLst>
               <a:ext uri="{FF2B5EF4-FFF2-40B4-BE49-F238E27FC236}">
-                <a16:creationId xmlns:a16="http://schemas.microsoft.com/office/drawing/2014/main" id="{F047EA8A-1DBC-4DC5-AFDA-FDD9B9552A97}"/>
+                <a16:creationId xmlns:a16="http://schemas.microsoft.com/office/drawing/2014/main" id="{F5154C5E-EA88-4F4D-8A3B-4446B1BC1907}"/>
               </a:ext>
             </a:extLst>
           </p:cNvPr>
@@ -7321,65 +7482,71 @@
           <a:p>
             <a:r>
               <a:rPr lang="fr-FR" dirty="0"/>
-              <a:t>Moteur de Base de données de Microsoft</a:t>
+              <a:t>Définitions</a:t>
+            </a:r>
+          </a:p>
+          <a:p>
+            <a:r>
+              <a:rPr lang="fr-FR" dirty="0"/>
+              <a:t>Installation et configuration SQL Server</a:t>
+            </a:r>
+          </a:p>
+          <a:p>
+            <a:r>
+              <a:rPr lang="fr-FR" dirty="0"/>
+              <a:t>SQL Server Management Studio</a:t>
             </a:r>
           </a:p>
           <a:p>
             <a:pPr lvl="1"/>
             <a:r>
               <a:rPr lang="fr-FR" dirty="0"/>
-              <a:t>Mais pas que…</a:t>
-            </a:r>
-          </a:p>
-          <a:p>
-            <a:pPr lvl="0"/>
-            <a:r>
-              <a:rPr lang="fr-FR" dirty="0"/>
-              <a:t>Permet de stocker de</a:t>
-            </a:r>
-            <a:r>
-              <a:rPr lang="fr-FR" baseline="0" dirty="0"/>
-              <a:t>s données sous forme tabulaire</a:t>
+              <a:t>Création de tables</a:t>
             </a:r>
           </a:p>
           <a:p>
             <a:pPr lvl="1"/>
             <a:r>
               <a:rPr lang="fr-FR" dirty="0"/>
-              <a:t>Mais pas que…</a:t>
+              <a:t>Insertion et modifications de données</a:t>
             </a:r>
           </a:p>
           <a:p>
             <a:pPr lvl="1"/>
             <a:r>
               <a:rPr lang="fr-FR" dirty="0"/>
-              <a:t>Suite logicielle complète permettant de gérer les données d’une entreprise</a:t>
-            </a:r>
-          </a:p>
-          <a:p>
-            <a:pPr lvl="0"/>
-            <a:r>
-              <a:rPr lang="fr-FR" dirty="0"/>
-              <a:t>Interrogeable en </a:t>
+              <a:t>Modification de tables</a:t>
+            </a:r>
+          </a:p>
+          <a:p>
+            <a:r>
+              <a:rPr lang="fr-FR" dirty="0"/>
+              <a:t>Backup, restauration et </a:t>
             </a:r>
             <a:r>
               <a:rPr lang="fr-FR" dirty="0" err="1"/>
-              <a:t>Transact</a:t>
-            </a:r>
-            <a:r>
-              <a:rPr lang="fr-FR" dirty="0"/>
-              <a:t> SQL</a:t>
+              <a:t>scripting</a:t>
+            </a:r>
+            <a:endParaRPr lang="fr-FR" dirty="0"/>
+          </a:p>
+          <a:p>
+            <a:r>
+              <a:rPr lang="fr-FR" dirty="0"/>
+              <a:t>Pour aller plus loin…</a:t>
             </a:r>
           </a:p>
           <a:p>
             <a:pPr lvl="1"/>
             <a:r>
               <a:rPr lang="fr-FR" dirty="0"/>
-              <a:t>Chaque</a:t>
-            </a:r>
-            <a:r>
-              <a:rPr lang="fr-FR" baseline="0" dirty="0"/>
-              <a:t> environnement a ses spécificités</a:t>
+              <a:t>SQL Server Profiler et statistiques</a:t>
+            </a:r>
+          </a:p>
+          <a:p>
+            <a:pPr lvl="1"/>
+            <a:r>
+              <a:rPr lang="fr-FR" dirty="0"/>
+              <a:t>Plan d’exécution, statistiques d’exécutions</a:t>
             </a:r>
           </a:p>
         </p:txBody>
@@ -7389,7 +7556,7 @@
           <p:cNvPr id="4" name="Espace réservé du numéro de diapositive 3">
             <a:extLst>
               <a:ext uri="{FF2B5EF4-FFF2-40B4-BE49-F238E27FC236}">
-                <a16:creationId xmlns:a16="http://schemas.microsoft.com/office/drawing/2014/main" id="{BB6ED890-A3FF-40D5-926C-E47284245F05}"/>
+                <a16:creationId xmlns:a16="http://schemas.microsoft.com/office/drawing/2014/main" id="{E248A640-1647-4D35-A348-80D044FE7717}"/>
               </a:ext>
             </a:extLst>
           </p:cNvPr>
@@ -7416,7 +7583,7 @@
     </p:spTree>
     <p:extLst>
       <p:ext uri="{BB962C8B-B14F-4D97-AF65-F5344CB8AC3E}">
-        <p14:creationId xmlns:p14="http://schemas.microsoft.com/office/powerpoint/2010/main" val="2107264681"/>
+        <p14:creationId xmlns:p14="http://schemas.microsoft.com/office/powerpoint/2010/main" val="782974399"/>
       </p:ext>
     </p:extLst>
   </p:cSld>
@@ -7448,7 +7615,7 @@
           <p:cNvPr id="2" name="Titre 1">
             <a:extLst>
               <a:ext uri="{FF2B5EF4-FFF2-40B4-BE49-F238E27FC236}">
-                <a16:creationId xmlns:a16="http://schemas.microsoft.com/office/drawing/2014/main" id="{9BD6FEAA-03C0-456E-B72E-61AE31867947}"/>
+                <a16:creationId xmlns:a16="http://schemas.microsoft.com/office/drawing/2014/main" id="{217FEAFC-2EEE-4C5A-848E-A160E2807582}"/>
               </a:ext>
             </a:extLst>
           </p:cNvPr>
@@ -7466,7 +7633,7 @@
           <a:p>
             <a:r>
               <a:rPr lang="fr-FR" dirty="0"/>
-              <a:t>Historique</a:t>
+              <a:t>SQL Server</a:t>
             </a:r>
           </a:p>
         </p:txBody>
@@ -7476,7 +7643,7 @@
           <p:cNvPr id="3" name="Espace réservé du contenu 2">
             <a:extLst>
               <a:ext uri="{FF2B5EF4-FFF2-40B4-BE49-F238E27FC236}">
-                <a16:creationId xmlns:a16="http://schemas.microsoft.com/office/drawing/2014/main" id="{908B2907-612D-4566-BA22-3856EADC8BA5}"/>
+                <a16:creationId xmlns:a16="http://schemas.microsoft.com/office/drawing/2014/main" id="{F047EA8A-1DBC-4DC5-AFDA-FDD9B9552A97}"/>
               </a:ext>
             </a:extLst>
           </p:cNvPr>
@@ -7494,75 +7661,65 @@
           <a:p>
             <a:r>
               <a:rPr lang="fr-FR" dirty="0"/>
-              <a:t>Provient de Sybase SQL, existe depuis 1989</a:t>
-            </a:r>
-          </a:p>
-          <a:p>
-            <a:r>
-              <a:rPr lang="fr-FR" dirty="0"/>
-              <a:t>Principales</a:t>
+              <a:t>Moteur de Base de données de Microsoft</a:t>
+            </a:r>
+          </a:p>
+          <a:p>
+            <a:pPr lvl="1"/>
+            <a:r>
+              <a:rPr lang="fr-FR" dirty="0"/>
+              <a:t>Mais pas que…</a:t>
+            </a:r>
+          </a:p>
+          <a:p>
+            <a:pPr lvl="0"/>
+            <a:r>
+              <a:rPr lang="fr-FR" dirty="0"/>
+              <a:t>Permet de stocker de</a:t>
             </a:r>
             <a:r>
               <a:rPr lang="fr-FR" baseline="0" dirty="0"/>
-              <a:t> versions </a:t>
+              <a:t>s données sous forme tabulaire</a:t>
             </a:r>
           </a:p>
           <a:p>
             <a:pPr lvl="1"/>
             <a:r>
               <a:rPr lang="fr-FR" dirty="0"/>
-              <a:t>2000</a:t>
+              <a:t>Mais pas que…</a:t>
             </a:r>
           </a:p>
           <a:p>
             <a:pPr lvl="1"/>
             <a:r>
               <a:rPr lang="fr-FR" dirty="0"/>
-              <a:t>Réécriture en 2005</a:t>
+              <a:t>Suite logicielle complète permettant de gérer les données d’une entreprise</a:t>
+            </a:r>
+          </a:p>
+          <a:p>
+            <a:pPr lvl="0"/>
+            <a:r>
+              <a:rPr lang="fr-FR" dirty="0"/>
+              <a:t>Interrogeable en </a:t>
+            </a:r>
+            <a:r>
+              <a:rPr lang="fr-FR" dirty="0" err="1"/>
+              <a:t>Transact</a:t>
+            </a:r>
+            <a:r>
+              <a:rPr lang="fr-FR" dirty="0"/>
+              <a:t> SQL</a:t>
             </a:r>
           </a:p>
           <a:p>
             <a:pPr lvl="1"/>
             <a:r>
               <a:rPr lang="fr-FR" dirty="0"/>
-              <a:t>2008,</a:t>
+              <a:t>Chaque</a:t>
             </a:r>
             <a:r>
               <a:rPr lang="fr-FR" baseline="0" dirty="0"/>
-              <a:t> 2012, 2014, 2016, 2017, 2019 (</a:t>
-            </a:r>
-            <a:r>
-              <a:rPr lang="fr-FR" baseline="0" dirty="0" err="1"/>
-              <a:t>Preview</a:t>
-            </a:r>
-            <a:r>
-              <a:rPr lang="fr-FR" baseline="0" dirty="0"/>
-              <a:t>)</a:t>
-            </a:r>
-          </a:p>
-          <a:p>
-            <a:pPr lvl="1"/>
-            <a:r>
-              <a:rPr lang="fr-FR" baseline="0" dirty="0"/>
-              <a:t>Fonctionne sous Windows, voir Windows Server</a:t>
-            </a:r>
-          </a:p>
-          <a:p>
-            <a:pPr lvl="1"/>
-            <a:r>
-              <a:rPr lang="fr-FR" baseline="0" dirty="0"/>
-              <a:t>Depuis 2017, gestion de linux</a:t>
-            </a:r>
-          </a:p>
-          <a:p>
-            <a:pPr lvl="2"/>
-            <a:r>
-              <a:rPr lang="fr-FR" dirty="0"/>
-              <a:t>Notamment</a:t>
-            </a:r>
-            <a:r>
-              <a:rPr lang="fr-FR" baseline="0" dirty="0"/>
-              <a:t> Docker</a:t>
+              <a:t> environnement a ses spécificités</a:t>
             </a:r>
           </a:p>
         </p:txBody>
@@ -7572,7 +7729,7 @@
           <p:cNvPr id="4" name="Espace réservé du numéro de diapositive 3">
             <a:extLst>
               <a:ext uri="{FF2B5EF4-FFF2-40B4-BE49-F238E27FC236}">
-                <a16:creationId xmlns:a16="http://schemas.microsoft.com/office/drawing/2014/main" id="{4C0C688D-A08A-4D0A-9418-9F87BFB66C80}"/>
+                <a16:creationId xmlns:a16="http://schemas.microsoft.com/office/drawing/2014/main" id="{BB6ED890-A3FF-40D5-926C-E47284245F05}"/>
               </a:ext>
             </a:extLst>
           </p:cNvPr>
@@ -7599,7 +7756,7 @@
     </p:spTree>
     <p:extLst>
       <p:ext uri="{BB962C8B-B14F-4D97-AF65-F5344CB8AC3E}">
-        <p14:creationId xmlns:p14="http://schemas.microsoft.com/office/powerpoint/2010/main" val="2327955547"/>
+        <p14:creationId xmlns:p14="http://schemas.microsoft.com/office/powerpoint/2010/main" val="2107264681"/>
       </p:ext>
     </p:extLst>
   </p:cSld>
@@ -7631,7 +7788,7 @@
           <p:cNvPr id="2" name="Titre 1">
             <a:extLst>
               <a:ext uri="{FF2B5EF4-FFF2-40B4-BE49-F238E27FC236}">
-                <a16:creationId xmlns:a16="http://schemas.microsoft.com/office/drawing/2014/main" id="{272B36F4-9074-4675-B145-B010E6577078}"/>
+                <a16:creationId xmlns:a16="http://schemas.microsoft.com/office/drawing/2014/main" id="{9BD6FEAA-03C0-456E-B72E-61AE31867947}"/>
               </a:ext>
             </a:extLst>
           </p:cNvPr>
@@ -7648,12 +7805,8 @@
           <a:lstStyle/>
           <a:p>
             <a:r>
-              <a:rPr lang="fr-FR" dirty="0" err="1"/>
-              <a:t>Licensing</a:t>
-            </a:r>
-            <a:r>
-              <a:rPr lang="fr-FR" dirty="0"/>
-              <a:t> (1/2)</a:t>
+              <a:rPr lang="fr-FR" dirty="0"/>
+              <a:t>Historique</a:t>
             </a:r>
           </a:p>
         </p:txBody>
@@ -7663,7 +7816,7 @@
           <p:cNvPr id="3" name="Espace réservé du contenu 2">
             <a:extLst>
               <a:ext uri="{FF2B5EF4-FFF2-40B4-BE49-F238E27FC236}">
-                <a16:creationId xmlns:a16="http://schemas.microsoft.com/office/drawing/2014/main" id="{D6E567E2-54BD-4393-BA35-2AD37222EDCD}"/>
+                <a16:creationId xmlns:a16="http://schemas.microsoft.com/office/drawing/2014/main" id="{908B2907-612D-4566-BA22-3856EADC8BA5}"/>
               </a:ext>
             </a:extLst>
           </p:cNvPr>
@@ -7681,115 +7834,75 @@
           <a:p>
             <a:r>
               <a:rPr lang="fr-FR" dirty="0"/>
-              <a:t>SQL Server est</a:t>
+              <a:t>Provient de Sybase SQL, existe depuis 1989</a:t>
+            </a:r>
+          </a:p>
+          <a:p>
+            <a:r>
+              <a:rPr lang="fr-FR" dirty="0"/>
+              <a:t>Principales</a:t>
             </a:r>
             <a:r>
               <a:rPr lang="fr-FR" baseline="0" dirty="0"/>
-              <a:t> souvent payant, parfois gratuit</a:t>
-            </a:r>
-          </a:p>
-          <a:p>
+              <a:t> versions </a:t>
+            </a:r>
+          </a:p>
+          <a:p>
+            <a:pPr lvl="1"/>
+            <a:r>
+              <a:rPr lang="fr-FR" dirty="0"/>
+              <a:t>2000</a:t>
+            </a:r>
+          </a:p>
+          <a:p>
+            <a:pPr lvl="1"/>
+            <a:r>
+              <a:rPr lang="fr-FR" dirty="0"/>
+              <a:t>Réécriture en 2005</a:t>
+            </a:r>
+          </a:p>
+          <a:p>
+            <a:pPr lvl="1"/>
+            <a:r>
+              <a:rPr lang="fr-FR" dirty="0"/>
+              <a:t>2008,</a:t>
+            </a:r>
             <a:r>
               <a:rPr lang="fr-FR" baseline="0" dirty="0"/>
-              <a:t>Plusieurs éditions</a:t>
+              <a:t> 2012, 2014, 2016, 2017, 2019 (</a:t>
+            </a:r>
+            <a:r>
+              <a:rPr lang="fr-FR" baseline="0" dirty="0" err="1"/>
+              <a:t>Preview</a:t>
+            </a:r>
+            <a:r>
+              <a:rPr lang="fr-FR" baseline="0" dirty="0"/>
+              <a:t>)</a:t>
             </a:r>
           </a:p>
           <a:p>
             <a:pPr lvl="1"/>
             <a:r>
               <a:rPr lang="fr-FR" baseline="0" dirty="0"/>
-              <a:t>Standard, Entreprise, Data Center, Web</a:t>
+              <a:t>Fonctionne sous Windows, voir Windows Server</a:t>
+            </a:r>
+          </a:p>
+          <a:p>
+            <a:pPr lvl="1"/>
+            <a:r>
+              <a:rPr lang="fr-FR" baseline="0" dirty="0"/>
+              <a:t>Depuis 2017, gestion de linux</a:t>
             </a:r>
           </a:p>
           <a:p>
             <a:pPr lvl="2"/>
             <a:r>
+              <a:rPr lang="fr-FR" dirty="0"/>
+              <a:t>Notamment</a:t>
+            </a:r>
+            <a:r>
               <a:rPr lang="fr-FR" baseline="0" dirty="0"/>
-              <a:t>Payantes (très chères)</a:t>
-            </a:r>
-          </a:p>
-          <a:p>
-            <a:pPr lvl="2"/>
-            <a:r>
-              <a:rPr lang="fr-FR" baseline="0" dirty="0"/>
-              <a:t>Support</a:t>
-            </a:r>
-          </a:p>
-          <a:p>
-            <a:pPr lvl="2"/>
-            <a:r>
-              <a:rPr lang="fr-FR" baseline="0" dirty="0"/>
-              <a:t>Paiement en fonction de l’</a:t>
-            </a:r>
-            <a:r>
-              <a:rPr lang="fr-FR" baseline="0" dirty="0" err="1"/>
-              <a:t>instrastructure</a:t>
-            </a:r>
-            <a:r>
-              <a:rPr lang="fr-FR" baseline="0" dirty="0"/>
-              <a:t> (ex : #processeurs)</a:t>
-            </a:r>
-          </a:p>
-          <a:p>
-            <a:pPr lvl="1"/>
-            <a:r>
-              <a:rPr lang="fr-FR" baseline="0" dirty="0"/>
-              <a:t>Web</a:t>
-            </a:r>
-          </a:p>
-          <a:p>
-            <a:pPr lvl="2"/>
-            <a:r>
-              <a:rPr lang="fr-FR" baseline="0" dirty="0"/>
-              <a:t>Beaucoup moins chère mais utilisation que pour des applications web.</a:t>
-            </a:r>
-          </a:p>
-          <a:p>
-            <a:pPr lvl="1"/>
-            <a:r>
-              <a:rPr lang="fr-FR" dirty="0" err="1"/>
-              <a:t>Developer</a:t>
-            </a:r>
-            <a:r>
-              <a:rPr lang="fr-FR" dirty="0"/>
-              <a:t> Edition</a:t>
-            </a:r>
-          </a:p>
-          <a:p>
-            <a:pPr lvl="2"/>
-            <a:r>
-              <a:rPr lang="fr-FR" dirty="0"/>
-              <a:t>Gratuite &amp; complète</a:t>
-            </a:r>
-          </a:p>
-          <a:p>
-            <a:pPr lvl="3"/>
-            <a:r>
-              <a:rPr lang="fr-FR" dirty="0"/>
-              <a:t>Quasiment</a:t>
-            </a:r>
-            <a:r>
-              <a:rPr lang="fr-FR" baseline="0" dirty="0"/>
-              <a:t> tout ce qu’a la version entreprise</a:t>
-            </a:r>
-            <a:endParaRPr lang="fr-FR" dirty="0"/>
-          </a:p>
-          <a:p>
-            <a:pPr lvl="2"/>
-            <a:r>
-              <a:rPr lang="fr-FR" dirty="0"/>
-              <a:t>Celle à privilégier pour le développement</a:t>
-            </a:r>
-          </a:p>
-          <a:p>
-            <a:pPr lvl="2"/>
-            <a:r>
-              <a:rPr lang="fr-FR" dirty="0"/>
-              <a:t>Utilisation en production</a:t>
-            </a:r>
-            <a:r>
-              <a:rPr lang="fr-FR" baseline="0" dirty="0"/>
-              <a:t> interdite</a:t>
+              <a:t> Docker</a:t>
             </a:r>
           </a:p>
         </p:txBody>
@@ -7799,7 +7912,7 @@
           <p:cNvPr id="4" name="Espace réservé du numéro de diapositive 3">
             <a:extLst>
               <a:ext uri="{FF2B5EF4-FFF2-40B4-BE49-F238E27FC236}">
-                <a16:creationId xmlns:a16="http://schemas.microsoft.com/office/drawing/2014/main" id="{FB796476-AADA-49D0-BB89-EFA955DE1463}"/>
+                <a16:creationId xmlns:a16="http://schemas.microsoft.com/office/drawing/2014/main" id="{4C0C688D-A08A-4D0A-9418-9F87BFB66C80}"/>
               </a:ext>
             </a:extLst>
           </p:cNvPr>
@@ -7826,7 +7939,7 @@
     </p:spTree>
     <p:extLst>
       <p:ext uri="{BB962C8B-B14F-4D97-AF65-F5344CB8AC3E}">
-        <p14:creationId xmlns:p14="http://schemas.microsoft.com/office/powerpoint/2010/main" val="1490349282"/>
+        <p14:creationId xmlns:p14="http://schemas.microsoft.com/office/powerpoint/2010/main" val="2327955547"/>
       </p:ext>
     </p:extLst>
   </p:cSld>
@@ -7858,7 +7971,7 @@
           <p:cNvPr id="2" name="Titre 1">
             <a:extLst>
               <a:ext uri="{FF2B5EF4-FFF2-40B4-BE49-F238E27FC236}">
-                <a16:creationId xmlns:a16="http://schemas.microsoft.com/office/drawing/2014/main" id="{0FEE75D7-D342-444F-9ABC-F9CAC9BFBD9B}"/>
+                <a16:creationId xmlns:a16="http://schemas.microsoft.com/office/drawing/2014/main" id="{272B36F4-9074-4675-B145-B010E6577078}"/>
               </a:ext>
             </a:extLst>
           </p:cNvPr>
@@ -7880,7 +7993,7 @@
             </a:r>
             <a:r>
               <a:rPr lang="fr-FR" dirty="0"/>
-              <a:t> (2/2)</a:t>
+              <a:t> (1/2)</a:t>
             </a:r>
           </a:p>
         </p:txBody>
@@ -7890,7 +8003,7 @@
           <p:cNvPr id="3" name="Espace réservé du contenu 2">
             <a:extLst>
               <a:ext uri="{FF2B5EF4-FFF2-40B4-BE49-F238E27FC236}">
-                <a16:creationId xmlns:a16="http://schemas.microsoft.com/office/drawing/2014/main" id="{3C597469-BC5B-498F-9EA1-F2A25AC015F4}"/>
+                <a16:creationId xmlns:a16="http://schemas.microsoft.com/office/drawing/2014/main" id="{D6E567E2-54BD-4393-BA35-2AD37222EDCD}"/>
               </a:ext>
             </a:extLst>
           </p:cNvPr>
@@ -7908,107 +8021,115 @@
           <a:p>
             <a:r>
               <a:rPr lang="fr-FR" dirty="0"/>
-              <a:t>SQL Express</a:t>
+              <a:t>SQL Server est</a:t>
+            </a:r>
+            <a:r>
+              <a:rPr lang="fr-FR" baseline="0" dirty="0"/>
+              <a:t> souvent payant, parfois gratuit</a:t>
+            </a:r>
+          </a:p>
+          <a:p>
+            <a:r>
+              <a:rPr lang="fr-FR" baseline="0" dirty="0"/>
+              <a:t>Plusieurs éditions</a:t>
             </a:r>
           </a:p>
           <a:p>
             <a:pPr lvl="1"/>
             <a:r>
-              <a:rPr lang="fr-FR" dirty="0"/>
-              <a:t>Plus légère</a:t>
+              <a:rPr lang="fr-FR" baseline="0" dirty="0"/>
+              <a:t>Standard, Entreprise, Data Center, Web</a:t>
+            </a:r>
+          </a:p>
+          <a:p>
+            <a:pPr lvl="2"/>
+            <a:r>
+              <a:rPr lang="fr-FR" baseline="0" dirty="0"/>
+              <a:t>Payantes (très chères)</a:t>
+            </a:r>
+          </a:p>
+          <a:p>
+            <a:pPr lvl="2"/>
+            <a:r>
+              <a:rPr lang="fr-FR" baseline="0" dirty="0"/>
+              <a:t>Support</a:t>
+            </a:r>
+          </a:p>
+          <a:p>
+            <a:pPr lvl="2"/>
+            <a:r>
+              <a:rPr lang="fr-FR" baseline="0" dirty="0"/>
+              <a:t>Paiement en fonction de l’</a:t>
+            </a:r>
+            <a:r>
+              <a:rPr lang="fr-FR" baseline="0" dirty="0" err="1"/>
+              <a:t>instrastructure</a:t>
+            </a:r>
+            <a:r>
+              <a:rPr lang="fr-FR" baseline="0" dirty="0"/>
+              <a:t> (ex : #processeurs)</a:t>
             </a:r>
           </a:p>
           <a:p>
             <a:pPr lvl="1"/>
             <a:r>
-              <a:rPr lang="fr-FR" dirty="0"/>
-              <a:t>Fonctionnalités les plus importantes</a:t>
+              <a:rPr lang="fr-FR" baseline="0" dirty="0"/>
+              <a:t>Web</a:t>
+            </a:r>
+          </a:p>
+          <a:p>
+            <a:pPr lvl="2"/>
+            <a:r>
+              <a:rPr lang="fr-FR" baseline="0" dirty="0"/>
+              <a:t>Beaucoup moins chère mais utilisation que pour des applications web.</a:t>
             </a:r>
           </a:p>
           <a:p>
             <a:pPr lvl="1"/>
             <a:r>
-              <a:rPr lang="fr-FR" dirty="0"/>
-              <a:t>Limitations</a:t>
+              <a:rPr lang="fr-FR" dirty="0" err="1"/>
+              <a:t>Developer</a:t>
+            </a:r>
+            <a:r>
+              <a:rPr lang="fr-FR" dirty="0"/>
+              <a:t> Edition</a:t>
+            </a:r>
+          </a:p>
+          <a:p>
+            <a:pPr lvl="2"/>
+            <a:r>
+              <a:rPr lang="fr-FR" dirty="0"/>
+              <a:t>Gratuite &amp; complète</a:t>
+            </a:r>
+          </a:p>
+          <a:p>
+            <a:pPr lvl="3"/>
+            <a:r>
+              <a:rPr lang="fr-FR" dirty="0"/>
+              <a:t>Quasiment</a:t>
             </a:r>
             <a:r>
               <a:rPr lang="fr-FR" baseline="0" dirty="0"/>
-              <a:t> « hardware » :</a:t>
-            </a:r>
+              <a:t> tout ce qu’a la version entreprise</a:t>
+            </a:r>
+            <a:endParaRPr lang="fr-FR" dirty="0"/>
           </a:p>
           <a:p>
             <a:pPr lvl="2"/>
             <a:r>
               <a:rPr lang="fr-FR" dirty="0"/>
-              <a:t>1 CPU physique max</a:t>
+              <a:t>Celle à privilégier pour le développement</a:t>
             </a:r>
           </a:p>
           <a:p>
             <a:pPr lvl="2"/>
             <a:r>
               <a:rPr lang="fr-FR" dirty="0"/>
-              <a:t>1 Go de ram max</a:t>
-            </a:r>
-          </a:p>
-          <a:p>
-            <a:pPr lvl="2"/>
-            <a:r>
-              <a:rPr lang="fr-FR" dirty="0"/>
-              <a:t>10 Go/BDD max</a:t>
-            </a:r>
-          </a:p>
-          <a:p>
-            <a:pPr lvl="0"/>
-            <a:r>
-              <a:rPr lang="fr-FR" dirty="0" err="1"/>
-              <a:t>LocalDb</a:t>
-            </a:r>
-            <a:endParaRPr lang="fr-FR" dirty="0"/>
-          </a:p>
-          <a:p>
-            <a:pPr lvl="1"/>
-            <a:r>
-              <a:rPr lang="fr-FR" dirty="0"/>
-              <a:t>Plus récente (2012)</a:t>
-            </a:r>
-          </a:p>
-          <a:p>
-            <a:pPr lvl="1"/>
-            <a:r>
-              <a:rPr lang="fr-FR" dirty="0"/>
-              <a:t>Uniquement</a:t>
+              <a:t>Utilisation en production</a:t>
             </a:r>
             <a:r>
               <a:rPr lang="fr-FR" baseline="0" dirty="0"/>
-              <a:t> le moteur de base de données</a:t>
-            </a:r>
-          </a:p>
-          <a:p>
-            <a:pPr lvl="1"/>
-            <a:r>
-              <a:rPr lang="fr-FR" baseline="0" dirty="0"/>
-              <a:t>Un simple exe à appeler pour créer une base de données, rien à installer autrement</a:t>
-            </a:r>
-          </a:p>
-          <a:p>
-            <a:pPr lvl="1"/>
-            <a:r>
-              <a:rPr lang="fr-FR" baseline="0" dirty="0"/>
-              <a:t>Bases de données par utilisateur</a:t>
-            </a:r>
-          </a:p>
-          <a:p>
-            <a:pPr lvl="1"/>
-            <a:r>
-              <a:rPr lang="fr-FR" baseline="0" dirty="0"/>
-              <a:t>Pour le développement uniquement</a:t>
-            </a:r>
-          </a:p>
-          <a:p>
-            <a:pPr lvl="1"/>
-            <a:r>
-              <a:rPr lang="fr-FR" baseline="0" dirty="0"/>
-              <a:t>Installé par Visual Studio</a:t>
+              <a:t> interdite</a:t>
             </a:r>
           </a:p>
         </p:txBody>
@@ -8018,7 +8139,7 @@
           <p:cNvPr id="4" name="Espace réservé du numéro de diapositive 3">
             <a:extLst>
               <a:ext uri="{FF2B5EF4-FFF2-40B4-BE49-F238E27FC236}">
-                <a16:creationId xmlns:a16="http://schemas.microsoft.com/office/drawing/2014/main" id="{EF960459-E433-4103-A039-E01D3EFEE022}"/>
+                <a16:creationId xmlns:a16="http://schemas.microsoft.com/office/drawing/2014/main" id="{FB796476-AADA-49D0-BB89-EFA955DE1463}"/>
               </a:ext>
             </a:extLst>
           </p:cNvPr>
@@ -8045,7 +8166,7 @@
     </p:spTree>
     <p:extLst>
       <p:ext uri="{BB962C8B-B14F-4D97-AF65-F5344CB8AC3E}">
-        <p14:creationId xmlns:p14="http://schemas.microsoft.com/office/powerpoint/2010/main" val="3144664967"/>
+        <p14:creationId xmlns:p14="http://schemas.microsoft.com/office/powerpoint/2010/main" val="1490349282"/>
       </p:ext>
     </p:extLst>
   </p:cSld>
@@ -8077,7 +8198,7 @@
           <p:cNvPr id="2" name="Titre 1">
             <a:extLst>
               <a:ext uri="{FF2B5EF4-FFF2-40B4-BE49-F238E27FC236}">
-                <a16:creationId xmlns:a16="http://schemas.microsoft.com/office/drawing/2014/main" id="{D6244190-7008-4252-B883-64AF9F90BB4E}"/>
+                <a16:creationId xmlns:a16="http://schemas.microsoft.com/office/drawing/2014/main" id="{0FEE75D7-D342-444F-9ABC-F9CAC9BFBD9B}"/>
               </a:ext>
             </a:extLst>
           </p:cNvPr>
@@ -8094,14 +8215,13 @@
           <a:lstStyle/>
           <a:p>
             <a:r>
-              <a:rPr lang="fr-FR" dirty="0"/>
-              <a:t>Infrastructure</a:t>
-            </a:r>
-            <a:r>
-              <a:rPr lang="fr-FR" baseline="0" dirty="0"/>
-              <a:t> – Divers</a:t>
-            </a:r>
-            <a:endParaRPr lang="fr-FR" dirty="0"/>
+              <a:rPr lang="fr-FR" dirty="0" err="1"/>
+              <a:t>Licensing</a:t>
+            </a:r>
+            <a:r>
+              <a:rPr lang="fr-FR" dirty="0"/>
+              <a:t> (2/2)</a:t>
+            </a:r>
           </a:p>
         </p:txBody>
       </p:sp>
@@ -8110,7 +8230,7 @@
           <p:cNvPr id="3" name="Espace réservé du contenu 2">
             <a:extLst>
               <a:ext uri="{FF2B5EF4-FFF2-40B4-BE49-F238E27FC236}">
-                <a16:creationId xmlns:a16="http://schemas.microsoft.com/office/drawing/2014/main" id="{39A587DB-CE02-41FE-BEBA-1AC284A86D5D}"/>
+                <a16:creationId xmlns:a16="http://schemas.microsoft.com/office/drawing/2014/main" id="{3C597469-BC5B-498F-9EA1-F2A25AC015F4}"/>
               </a:ext>
             </a:extLst>
           </p:cNvPr>
@@ -8128,171 +8248,107 @@
           <a:p>
             <a:r>
               <a:rPr lang="fr-FR" dirty="0"/>
-              <a:t>SQL Server </a:t>
-            </a:r>
+              <a:t>SQL Express</a:t>
+            </a:r>
+          </a:p>
+          <a:p>
+            <a:pPr lvl="1"/>
+            <a:r>
+              <a:rPr lang="fr-FR" dirty="0"/>
+              <a:t>Plus légère</a:t>
+            </a:r>
+          </a:p>
+          <a:p>
+            <a:pPr lvl="1"/>
+            <a:r>
+              <a:rPr lang="fr-FR" dirty="0"/>
+              <a:t>Fonctionnalités les plus importantes</a:t>
+            </a:r>
+          </a:p>
+          <a:p>
+            <a:pPr lvl="1"/>
+            <a:r>
+              <a:rPr lang="fr-FR" dirty="0"/>
+              <a:t>Limitations</a:t>
+            </a:r>
+            <a:r>
+              <a:rPr lang="fr-FR" baseline="0" dirty="0"/>
+              <a:t> « hardware » :</a:t>
+            </a:r>
+          </a:p>
+          <a:p>
+            <a:pPr lvl="2"/>
+            <a:r>
+              <a:rPr lang="fr-FR" dirty="0"/>
+              <a:t>1 CPU physique max</a:t>
+            </a:r>
+          </a:p>
+          <a:p>
+            <a:pPr lvl="2"/>
+            <a:r>
+              <a:rPr lang="fr-FR" dirty="0"/>
+              <a:t>1 Go de ram max</a:t>
+            </a:r>
+          </a:p>
+          <a:p>
+            <a:pPr lvl="2"/>
+            <a:r>
+              <a:rPr lang="fr-FR" dirty="0"/>
+              <a:t>10 Go/BDD max</a:t>
+            </a:r>
+          </a:p>
+          <a:p>
+            <a:pPr lvl="0"/>
             <a:r>
               <a:rPr lang="fr-FR" dirty="0" err="1"/>
-              <a:t>Analysis</a:t>
+              <a:t>LocalDb</a:t>
+            </a:r>
+            <a:endParaRPr lang="fr-FR" dirty="0"/>
+          </a:p>
+          <a:p>
+            <a:pPr lvl="1"/>
+            <a:r>
+              <a:rPr lang="fr-FR" dirty="0"/>
+              <a:t>Plus récente (2012)</a:t>
+            </a:r>
+          </a:p>
+          <a:p>
+            <a:pPr lvl="1"/>
+            <a:r>
+              <a:rPr lang="fr-FR" dirty="0"/>
+              <a:t>Uniquement</a:t>
             </a:r>
             <a:r>
               <a:rPr lang="fr-FR" baseline="0" dirty="0"/>
-              <a:t> Services (SSAS)</a:t>
+              <a:t> le moteur de base de données</a:t>
             </a:r>
           </a:p>
           <a:p>
             <a:pPr lvl="1"/>
             <a:r>
-              <a:rPr lang="fr-FR" dirty="0"/>
-              <a:t>Cube,</a:t>
-            </a:r>
-            <a:r>
               <a:rPr lang="fr-FR" baseline="0" dirty="0"/>
-              <a:t> analyse de données</a:t>
-            </a:r>
-            <a:r>
-              <a:rPr lang="fr-FR" baseline="0"/>
-              <a:t>, décisionnel</a:t>
-            </a:r>
-            <a:endParaRPr lang="fr-FR" baseline="0" dirty="0"/>
+              <a:t>Un simple exe à appeler pour créer une base de données, rien à installer autrement</a:t>
+            </a:r>
           </a:p>
           <a:p>
             <a:pPr lvl="1"/>
             <a:r>
               <a:rPr lang="fr-FR" baseline="0" dirty="0"/>
-              <a:t>Pas dispo dans Express</a:t>
-            </a:r>
-          </a:p>
-          <a:p>
-            <a:pPr lvl="0"/>
-            <a:r>
-              <a:rPr lang="fr-FR" dirty="0"/>
-              <a:t>SQL Server </a:t>
-            </a:r>
-            <a:r>
-              <a:rPr lang="fr-FR" dirty="0" err="1"/>
-              <a:t>Integration</a:t>
-            </a:r>
-            <a:r>
-              <a:rPr lang="fr-FR" dirty="0"/>
-              <a:t> services (SSIS)</a:t>
+              <a:t>Bases de données par utilisateur</a:t>
             </a:r>
           </a:p>
           <a:p>
             <a:pPr lvl="1"/>
             <a:r>
-              <a:rPr lang="fr-FR" dirty="0"/>
-              <a:t>ETL</a:t>
-            </a:r>
-            <a:r>
               <a:rPr lang="fr-FR" baseline="0" dirty="0"/>
-              <a:t> (</a:t>
-            </a:r>
-            <a:r>
-              <a:rPr lang="fr-FR" baseline="0" dirty="0" err="1"/>
-              <a:t>Extract</a:t>
-            </a:r>
+              <a:t>Pour le développement uniquement</a:t>
+            </a:r>
+          </a:p>
+          <a:p>
+            <a:pPr lvl="1"/>
             <a:r>
               <a:rPr lang="fr-FR" baseline="0" dirty="0"/>
-              <a:t>, </a:t>
-            </a:r>
-            <a:r>
-              <a:rPr lang="fr-FR" baseline="0" dirty="0" err="1"/>
-              <a:t>transform</a:t>
-            </a:r>
-            <a:r>
-              <a:rPr lang="fr-FR" baseline="0" dirty="0"/>
-              <a:t>, </a:t>
-            </a:r>
-            <a:r>
-              <a:rPr lang="fr-FR" baseline="0" dirty="0" err="1"/>
-              <a:t>load</a:t>
-            </a:r>
-            <a:r>
-              <a:rPr lang="fr-FR" baseline="0" dirty="0"/>
-              <a:t>)</a:t>
-            </a:r>
-          </a:p>
-          <a:p>
-            <a:pPr lvl="1"/>
-            <a:r>
-              <a:rPr lang="fr-FR" baseline="0" dirty="0"/>
-              <a:t>Import/export de données</a:t>
-            </a:r>
-          </a:p>
-          <a:p>
-            <a:pPr lvl="1"/>
-            <a:r>
-              <a:rPr lang="fr-FR" baseline="0" dirty="0"/>
-              <a:t>Pas dispo dans Express</a:t>
-            </a:r>
-          </a:p>
-          <a:p>
-            <a:pPr lvl="0"/>
-            <a:r>
-              <a:rPr lang="fr-FR" dirty="0"/>
-              <a:t>SQL</a:t>
-            </a:r>
-            <a:r>
-              <a:rPr lang="fr-FR" baseline="0" dirty="0"/>
-              <a:t> Server </a:t>
-            </a:r>
-            <a:r>
-              <a:rPr lang="fr-FR" baseline="0" dirty="0" err="1"/>
-              <a:t>Reporting</a:t>
-            </a:r>
-            <a:r>
-              <a:rPr lang="fr-FR" baseline="0" dirty="0"/>
-              <a:t> Services (SSRS)</a:t>
-            </a:r>
-          </a:p>
-          <a:p>
-            <a:pPr lvl="1"/>
-            <a:r>
-              <a:rPr lang="fr-FR" dirty="0"/>
-              <a:t>Mise en place de rapports sur BDD et/ou SSAS</a:t>
-            </a:r>
-          </a:p>
-          <a:p>
-            <a:pPr lvl="1"/>
-            <a:r>
-              <a:rPr lang="fr-FR" dirty="0"/>
-              <a:t>Aide à la décision</a:t>
-            </a:r>
-          </a:p>
-          <a:p>
-            <a:pPr lvl="1"/>
-            <a:r>
-              <a:rPr lang="fr-FR" dirty="0"/>
-              <a:t>Dispo dans Express</a:t>
-            </a:r>
-          </a:p>
-          <a:p>
-            <a:pPr lvl="0"/>
-            <a:r>
-              <a:rPr lang="fr-FR" dirty="0"/>
-              <a:t>SQL</a:t>
-            </a:r>
-            <a:r>
-              <a:rPr lang="fr-FR" baseline="0" dirty="0"/>
-              <a:t> Server Agent Services (SSAS)</a:t>
-            </a:r>
-          </a:p>
-          <a:p>
-            <a:pPr lvl="1"/>
-            <a:r>
-              <a:rPr lang="fr-FR" dirty="0"/>
-              <a:t>Traitements réguliers (maintenance, backup,</a:t>
-            </a:r>
-            <a:r>
-              <a:rPr lang="fr-FR" baseline="0" dirty="0"/>
-              <a:t> alertes, purges régulières etc.)</a:t>
-            </a:r>
-          </a:p>
-          <a:p>
-            <a:pPr lvl="1"/>
-            <a:r>
-              <a:rPr lang="fr-FR" baseline="0" dirty="0"/>
-              <a:t>Pas dispo dans Express</a:t>
+              <a:t>Installé par Visual Studio</a:t>
             </a:r>
           </a:p>
         </p:txBody>
@@ -8302,7 +8358,7 @@
           <p:cNvPr id="4" name="Espace réservé du numéro de diapositive 3">
             <a:extLst>
               <a:ext uri="{FF2B5EF4-FFF2-40B4-BE49-F238E27FC236}">
-                <a16:creationId xmlns:a16="http://schemas.microsoft.com/office/drawing/2014/main" id="{9C8B1184-2F27-4043-A9D2-EFFD6D42DBC5}"/>
+                <a16:creationId xmlns:a16="http://schemas.microsoft.com/office/drawing/2014/main" id="{EF960459-E433-4103-A039-E01D3EFEE022}"/>
               </a:ext>
             </a:extLst>
           </p:cNvPr>
@@ -8329,7 +8385,7 @@
     </p:spTree>
     <p:extLst>
       <p:ext uri="{BB962C8B-B14F-4D97-AF65-F5344CB8AC3E}">
-        <p14:creationId xmlns:p14="http://schemas.microsoft.com/office/powerpoint/2010/main" val="1785146"/>
+        <p14:creationId xmlns:p14="http://schemas.microsoft.com/office/powerpoint/2010/main" val="3144664967"/>
       </p:ext>
     </p:extLst>
   </p:cSld>
@@ -8361,7 +8417,7 @@
           <p:cNvPr id="2" name="Titre 1">
             <a:extLst>
               <a:ext uri="{FF2B5EF4-FFF2-40B4-BE49-F238E27FC236}">
-                <a16:creationId xmlns:a16="http://schemas.microsoft.com/office/drawing/2014/main" id="{20D3D8A6-570D-4DA0-8994-F3588E48BC8F}"/>
+                <a16:creationId xmlns:a16="http://schemas.microsoft.com/office/drawing/2014/main" id="{D6244190-7008-4252-B883-64AF9F90BB4E}"/>
               </a:ext>
             </a:extLst>
           </p:cNvPr>
@@ -8379,8 +8435,13 @@
           <a:p>
             <a:r>
               <a:rPr lang="fr-FR" dirty="0"/>
-              <a:t>SQL Server – Plan</a:t>
-            </a:r>
+              <a:t>Infrastructure</a:t>
+            </a:r>
+            <a:r>
+              <a:rPr lang="fr-FR" baseline="0" dirty="0"/>
+              <a:t> – Divers</a:t>
+            </a:r>
+            <a:endParaRPr lang="fr-FR" dirty="0"/>
           </a:p>
         </p:txBody>
       </p:sp>
@@ -8389,7 +8450,7 @@
           <p:cNvPr id="3" name="Espace réservé du contenu 2">
             <a:extLst>
               <a:ext uri="{FF2B5EF4-FFF2-40B4-BE49-F238E27FC236}">
-                <a16:creationId xmlns:a16="http://schemas.microsoft.com/office/drawing/2014/main" id="{4C4C5B88-FAFF-418D-B32E-A0F08167B412}"/>
+                <a16:creationId xmlns:a16="http://schemas.microsoft.com/office/drawing/2014/main" id="{39A587DB-CE02-41FE-BEBA-1AC284A86D5D}"/>
               </a:ext>
             </a:extLst>
           </p:cNvPr>
@@ -8407,33 +8468,172 @@
           <a:p>
             <a:r>
               <a:rPr lang="fr-FR" dirty="0"/>
-              <a:t>Instance SQL Server</a:t>
+              <a:t>SQL Server </a:t>
+            </a:r>
+            <a:r>
+              <a:rPr lang="fr-FR" dirty="0" err="1"/>
+              <a:t>Analysis</a:t>
+            </a:r>
+            <a:r>
+              <a:rPr lang="fr-FR" baseline="0" dirty="0"/>
+              <a:t> Services (SSAS)</a:t>
             </a:r>
           </a:p>
           <a:p>
             <a:pPr lvl="1"/>
             <a:r>
-              <a:rPr lang="fr-FR" sz="1800" dirty="0"/>
-              <a:t>Base de donnée</a:t>
-            </a:r>
-          </a:p>
-          <a:p>
-            <a:pPr lvl="2"/>
-            <a:r>
-              <a:rPr lang="fr-FR" sz="1800" dirty="0"/>
-              <a:t>Schéma</a:t>
-            </a:r>
-          </a:p>
-          <a:p>
-            <a:pPr lvl="3"/>
-            <a:r>
-              <a:rPr lang="fr-FR" sz="1800" dirty="0"/>
-              <a:t>Tables</a:t>
-            </a:r>
-          </a:p>
-          <a:p>
-            <a:pPr lvl="2"/>
-            <a:endParaRPr lang="fr-FR" dirty="0"/>
+              <a:rPr lang="fr-FR" dirty="0"/>
+              <a:t>Cube,</a:t>
+            </a:r>
+            <a:r>
+              <a:rPr lang="fr-FR" baseline="0" dirty="0"/>
+              <a:t> analyse de données</a:t>
+            </a:r>
+            <a:r>
+              <a:rPr lang="fr-FR" baseline="0"/>
+              <a:t>, décisionnel</a:t>
+            </a:r>
+            <a:endParaRPr lang="fr-FR" baseline="0" dirty="0"/>
+          </a:p>
+          <a:p>
+            <a:pPr lvl="1"/>
+            <a:r>
+              <a:rPr lang="fr-FR" baseline="0" dirty="0"/>
+              <a:t>Pas dispo dans Express</a:t>
+            </a:r>
+          </a:p>
+          <a:p>
+            <a:pPr lvl="0"/>
+            <a:r>
+              <a:rPr lang="fr-FR" dirty="0"/>
+              <a:t>SQL Server </a:t>
+            </a:r>
+            <a:r>
+              <a:rPr lang="fr-FR" dirty="0" err="1"/>
+              <a:t>Integration</a:t>
+            </a:r>
+            <a:r>
+              <a:rPr lang="fr-FR" dirty="0"/>
+              <a:t> services (SSIS)</a:t>
+            </a:r>
+          </a:p>
+          <a:p>
+            <a:pPr lvl="1"/>
+            <a:r>
+              <a:rPr lang="fr-FR" dirty="0"/>
+              <a:t>ETL</a:t>
+            </a:r>
+            <a:r>
+              <a:rPr lang="fr-FR" baseline="0" dirty="0"/>
+              <a:t> (</a:t>
+            </a:r>
+            <a:r>
+              <a:rPr lang="fr-FR" baseline="0" dirty="0" err="1"/>
+              <a:t>Extract</a:t>
+            </a:r>
+            <a:r>
+              <a:rPr lang="fr-FR" baseline="0" dirty="0"/>
+              <a:t>, </a:t>
+            </a:r>
+            <a:r>
+              <a:rPr lang="fr-FR" baseline="0" dirty="0" err="1"/>
+              <a:t>transform</a:t>
+            </a:r>
+            <a:r>
+              <a:rPr lang="fr-FR" baseline="0" dirty="0"/>
+              <a:t>, </a:t>
+            </a:r>
+            <a:r>
+              <a:rPr lang="fr-FR" baseline="0" dirty="0" err="1"/>
+              <a:t>load</a:t>
+            </a:r>
+            <a:r>
+              <a:rPr lang="fr-FR" baseline="0" dirty="0"/>
+              <a:t>)</a:t>
+            </a:r>
+          </a:p>
+          <a:p>
+            <a:pPr lvl="1"/>
+            <a:r>
+              <a:rPr lang="fr-FR" baseline="0" dirty="0"/>
+              <a:t>Import/export de données</a:t>
+            </a:r>
+          </a:p>
+          <a:p>
+            <a:pPr lvl="1"/>
+            <a:r>
+              <a:rPr lang="fr-FR" baseline="0" dirty="0"/>
+              <a:t>Pas dispo dans Express</a:t>
+            </a:r>
+          </a:p>
+          <a:p>
+            <a:pPr lvl="0"/>
+            <a:r>
+              <a:rPr lang="fr-FR" dirty="0"/>
+              <a:t>SQL</a:t>
+            </a:r>
+            <a:r>
+              <a:rPr lang="fr-FR" baseline="0" dirty="0"/>
+              <a:t> Server </a:t>
+            </a:r>
+            <a:r>
+              <a:rPr lang="fr-FR" baseline="0" dirty="0" err="1"/>
+              <a:t>Reporting</a:t>
+            </a:r>
+            <a:r>
+              <a:rPr lang="fr-FR" baseline="0" dirty="0"/>
+              <a:t> Services (SSRS)</a:t>
+            </a:r>
+          </a:p>
+          <a:p>
+            <a:pPr lvl="1"/>
+            <a:r>
+              <a:rPr lang="fr-FR" dirty="0"/>
+              <a:t>Mise en place de rapports sur BDD et/ou SSAS</a:t>
+            </a:r>
+          </a:p>
+          <a:p>
+            <a:pPr lvl="1"/>
+            <a:r>
+              <a:rPr lang="fr-FR" dirty="0"/>
+              <a:t>Aide à la décision</a:t>
+            </a:r>
+          </a:p>
+          <a:p>
+            <a:pPr lvl="1"/>
+            <a:r>
+              <a:rPr lang="fr-FR" dirty="0"/>
+              <a:t>Dispo dans Express</a:t>
+            </a:r>
+          </a:p>
+          <a:p>
+            <a:pPr lvl="0"/>
+            <a:r>
+              <a:rPr lang="fr-FR" dirty="0"/>
+              <a:t>SQL</a:t>
+            </a:r>
+            <a:r>
+              <a:rPr lang="fr-FR" baseline="0" dirty="0"/>
+              <a:t> Server Agent Services (SSAS)</a:t>
+            </a:r>
+          </a:p>
+          <a:p>
+            <a:pPr lvl="1"/>
+            <a:r>
+              <a:rPr lang="fr-FR" dirty="0"/>
+              <a:t>Traitements réguliers (maintenance, backup,</a:t>
+            </a:r>
+            <a:r>
+              <a:rPr lang="fr-FR" baseline="0" dirty="0"/>
+              <a:t> alertes, purges régulières etc.)</a:t>
+            </a:r>
+          </a:p>
+          <a:p>
+            <a:pPr lvl="1"/>
+            <a:r>
+              <a:rPr lang="fr-FR" baseline="0" dirty="0"/>
+              <a:t>Pas dispo dans Express</a:t>
+            </a:r>
           </a:p>
         </p:txBody>
       </p:sp>
@@ -8442,7 +8642,7 @@
           <p:cNvPr id="4" name="Espace réservé du numéro de diapositive 3">
             <a:extLst>
               <a:ext uri="{FF2B5EF4-FFF2-40B4-BE49-F238E27FC236}">
-                <a16:creationId xmlns:a16="http://schemas.microsoft.com/office/drawing/2014/main" id="{E9AE2B4E-3A93-4A64-84D7-E3116514FE60}"/>
+                <a16:creationId xmlns:a16="http://schemas.microsoft.com/office/drawing/2014/main" id="{9C8B1184-2F27-4043-A9D2-EFFD6D42DBC5}"/>
               </a:ext>
             </a:extLst>
           </p:cNvPr>
@@ -8469,7 +8669,7 @@
     </p:spTree>
     <p:extLst>
       <p:ext uri="{BB962C8B-B14F-4D97-AF65-F5344CB8AC3E}">
-        <p14:creationId xmlns:p14="http://schemas.microsoft.com/office/powerpoint/2010/main" val="2563292985"/>
+        <p14:creationId xmlns:p14="http://schemas.microsoft.com/office/powerpoint/2010/main" val="1785146"/>
       </p:ext>
     </p:extLst>
   </p:cSld>
@@ -8501,7 +8701,7 @@
           <p:cNvPr id="2" name="Titre 1">
             <a:extLst>
               <a:ext uri="{FF2B5EF4-FFF2-40B4-BE49-F238E27FC236}">
-                <a16:creationId xmlns:a16="http://schemas.microsoft.com/office/drawing/2014/main" id="{76904944-C646-4205-8C2E-CF853FC666EF}"/>
+                <a16:creationId xmlns:a16="http://schemas.microsoft.com/office/drawing/2014/main" id="{20D3D8A6-570D-4DA0-8994-F3588E48BC8F}"/>
               </a:ext>
             </a:extLst>
           </p:cNvPr>
@@ -8519,13 +8719,8 @@
           <a:p>
             <a:r>
               <a:rPr lang="fr-FR" dirty="0"/>
-              <a:t>Infrastructure –</a:t>
-            </a:r>
-            <a:r>
-              <a:rPr lang="fr-FR" baseline="0" dirty="0"/>
-              <a:t> Instance SQL</a:t>
-            </a:r>
-            <a:endParaRPr lang="fr-FR" dirty="0"/>
+              <a:t>SQL Server – Plan</a:t>
+            </a:r>
           </a:p>
         </p:txBody>
       </p:sp>
@@ -8534,7 +8729,7 @@
           <p:cNvPr id="3" name="Espace réservé du contenu 2">
             <a:extLst>
               <a:ext uri="{FF2B5EF4-FFF2-40B4-BE49-F238E27FC236}">
-                <a16:creationId xmlns:a16="http://schemas.microsoft.com/office/drawing/2014/main" id="{59390CC6-3579-4822-916F-290AAD57A3AF}"/>
+                <a16:creationId xmlns:a16="http://schemas.microsoft.com/office/drawing/2014/main" id="{4C4C5B88-FAFF-418D-B32E-A0F08167B412}"/>
               </a:ext>
             </a:extLst>
           </p:cNvPr>
@@ -8552,48 +8747,33 @@
           <a:p>
             <a:r>
               <a:rPr lang="fr-FR" dirty="0"/>
-              <a:t>Instance SQL</a:t>
+              <a:t>Instance SQL Server</a:t>
             </a:r>
           </a:p>
           <a:p>
             <a:pPr lvl="1"/>
             <a:r>
-              <a:rPr lang="fr-FR" dirty="0"/>
-              <a:t>Plusieurs</a:t>
-            </a:r>
-            <a:r>
-              <a:rPr lang="fr-FR" baseline="0" dirty="0"/>
-              <a:t> instances par machines possibles</a:t>
-            </a:r>
+              <a:rPr lang="fr-FR" sz="1800" dirty="0"/>
+              <a:t>Base de donnée</a:t>
+            </a:r>
+          </a:p>
+          <a:p>
+            <a:pPr lvl="2"/>
+            <a:r>
+              <a:rPr lang="fr-FR" sz="1800" dirty="0"/>
+              <a:t>Schéma</a:t>
+            </a:r>
+          </a:p>
+          <a:p>
+            <a:pPr lvl="3"/>
+            <a:r>
+              <a:rPr lang="fr-FR" sz="1800" dirty="0"/>
+              <a:t>Tables</a:t>
+            </a:r>
+          </a:p>
+          <a:p>
+            <a:pPr lvl="2"/>
             <a:endParaRPr lang="fr-FR" dirty="0"/>
-          </a:p>
-          <a:p>
-            <a:pPr lvl="1"/>
-            <a:r>
-              <a:rPr lang="fr-FR" dirty="0"/>
-              <a:t>1 instance = 1 service Windows</a:t>
-            </a:r>
-          </a:p>
-          <a:p>
-            <a:pPr lvl="1"/>
-            <a:r>
-              <a:rPr lang="fr-FR" dirty="0"/>
-              <a:t>Instance nommée</a:t>
-            </a:r>
-          </a:p>
-          <a:p>
-            <a:pPr lvl="1"/>
-            <a:r>
-              <a:rPr lang="fr-FR" dirty="0"/>
-              <a:t>Instance par défaut</a:t>
-            </a:r>
-          </a:p>
-          <a:p>
-            <a:pPr lvl="1"/>
-            <a:r>
-              <a:rPr lang="fr-FR" dirty="0"/>
-              <a:t>N bases par instances</a:t>
-            </a:r>
           </a:p>
         </p:txBody>
       </p:sp>
@@ -8602,7 +8782,7 @@
           <p:cNvPr id="4" name="Espace réservé du numéro de diapositive 3">
             <a:extLst>
               <a:ext uri="{FF2B5EF4-FFF2-40B4-BE49-F238E27FC236}">
-                <a16:creationId xmlns:a16="http://schemas.microsoft.com/office/drawing/2014/main" id="{016A9C84-A7FE-4AC4-A029-F2536E01954B}"/>
+                <a16:creationId xmlns:a16="http://schemas.microsoft.com/office/drawing/2014/main" id="{E9AE2B4E-3A93-4A64-84D7-E3116514FE60}"/>
               </a:ext>
             </a:extLst>
           </p:cNvPr>
@@ -8629,7 +8809,7 @@
     </p:spTree>
     <p:extLst>
       <p:ext uri="{BB962C8B-B14F-4D97-AF65-F5344CB8AC3E}">
-        <p14:creationId xmlns:p14="http://schemas.microsoft.com/office/powerpoint/2010/main" val="1037439774"/>
+        <p14:creationId xmlns:p14="http://schemas.microsoft.com/office/powerpoint/2010/main" val="2563292985"/>
       </p:ext>
     </p:extLst>
   </p:cSld>

</xml_diff>